<commit_message>
v3-update on democrat screenshot
</commit_message>
<xml_diff>
--- a/presentation/civic_duty_presentation_final_v3.pptx
+++ b/presentation/civic_duty_presentation_final_v3.pptx
@@ -4964,7 +4964,7 @@
         <p:fade/>
       </p:transition>
     </mc:Choice>
-    <mc:Fallback xmlns:p15="http://schemas.microsoft.com/office/powerpoint/2012/main" xmlns:com="http://schemas.openxmlformats.org/drawingml/2006/compatibility" xmlns:pvml="urn:schemas-microsoft-com:office:powerpoint" xmlns:v="urn:schemas-microsoft-com:vml" xmlns:o="urn:schemas-microsoft-com:office:office" xmlns:dgm="http://schemas.openxmlformats.org/drawingml/2006/diagram" xmlns:c="http://schemas.openxmlformats.org/drawingml/2006/chart" xmlns:mv="urn:schemas-microsoft-com:mac:vml" xmlns="">
+    <mc:Fallback xmlns="" xmlns:mv="urn:schemas-microsoft-com:mac:vml" xmlns:c="http://schemas.openxmlformats.org/drawingml/2006/chart" xmlns:dgm="http://schemas.openxmlformats.org/drawingml/2006/diagram" xmlns:o="urn:schemas-microsoft-com:office:office" xmlns:v="urn:schemas-microsoft-com:vml" xmlns:pvml="urn:schemas-microsoft-com:office:powerpoint" xmlns:com="http://schemas.openxmlformats.org/drawingml/2006/compatibility" xmlns:p15="http://schemas.microsoft.com/office/powerpoint/2012/main">
       <p:transition spd="slow">
         <p:fade/>
       </p:transition>
@@ -5973,7 +5973,7 @@
         <p:fade/>
       </p:transition>
     </mc:Choice>
-    <mc:Fallback xmlns:p15="http://schemas.microsoft.com/office/powerpoint/2012/main" xmlns:com="http://schemas.openxmlformats.org/drawingml/2006/compatibility" xmlns:pvml="urn:schemas-microsoft-com:office:powerpoint" xmlns:v="urn:schemas-microsoft-com:vml" xmlns:o="urn:schemas-microsoft-com:office:office" xmlns:dgm="http://schemas.openxmlformats.org/drawingml/2006/diagram" xmlns:c="http://schemas.openxmlformats.org/drawingml/2006/chart" xmlns:mv="urn:schemas-microsoft-com:mac:vml" xmlns="">
+    <mc:Fallback xmlns="" xmlns:mv="urn:schemas-microsoft-com:mac:vml" xmlns:c="http://schemas.openxmlformats.org/drawingml/2006/chart" xmlns:dgm="http://schemas.openxmlformats.org/drawingml/2006/diagram" xmlns:o="urn:schemas-microsoft-com:office:office" xmlns:v="urn:schemas-microsoft-com:vml" xmlns:pvml="urn:schemas-microsoft-com:office:powerpoint" xmlns:com="http://schemas.openxmlformats.org/drawingml/2006/compatibility" xmlns:p15="http://schemas.microsoft.com/office/powerpoint/2012/main">
       <p:transition spd="slow">
         <p:fade/>
       </p:transition>
@@ -6982,7 +6982,7 @@
         <p:fade/>
       </p:transition>
     </mc:Choice>
-    <mc:Fallback xmlns:p15="http://schemas.microsoft.com/office/powerpoint/2012/main" xmlns:com="http://schemas.openxmlformats.org/drawingml/2006/compatibility" xmlns:pvml="urn:schemas-microsoft-com:office:powerpoint" xmlns:v="urn:schemas-microsoft-com:vml" xmlns:o="urn:schemas-microsoft-com:office:office" xmlns:dgm="http://schemas.openxmlformats.org/drawingml/2006/diagram" xmlns:c="http://schemas.openxmlformats.org/drawingml/2006/chart" xmlns:mv="urn:schemas-microsoft-com:mac:vml" xmlns="">
+    <mc:Fallback xmlns="" xmlns:mv="urn:schemas-microsoft-com:mac:vml" xmlns:c="http://schemas.openxmlformats.org/drawingml/2006/chart" xmlns:dgm="http://schemas.openxmlformats.org/drawingml/2006/diagram" xmlns:o="urn:schemas-microsoft-com:office:office" xmlns:v="urn:schemas-microsoft-com:vml" xmlns:pvml="urn:schemas-microsoft-com:office:powerpoint" xmlns:com="http://schemas.openxmlformats.org/drawingml/2006/compatibility" xmlns:p15="http://schemas.microsoft.com/office/powerpoint/2012/main">
       <p:transition spd="slow">
         <p:fade/>
       </p:transition>
@@ -7991,7 +7991,7 @@
         <p:fade/>
       </p:transition>
     </mc:Choice>
-    <mc:Fallback xmlns:p15="http://schemas.microsoft.com/office/powerpoint/2012/main" xmlns:com="http://schemas.openxmlformats.org/drawingml/2006/compatibility" xmlns:pvml="urn:schemas-microsoft-com:office:powerpoint" xmlns:v="urn:schemas-microsoft-com:vml" xmlns:o="urn:schemas-microsoft-com:office:office" xmlns:dgm="http://schemas.openxmlformats.org/drawingml/2006/diagram" xmlns:c="http://schemas.openxmlformats.org/drawingml/2006/chart" xmlns:mv="urn:schemas-microsoft-com:mac:vml" xmlns="">
+    <mc:Fallback xmlns="" xmlns:mv="urn:schemas-microsoft-com:mac:vml" xmlns:c="http://schemas.openxmlformats.org/drawingml/2006/chart" xmlns:dgm="http://schemas.openxmlformats.org/drawingml/2006/diagram" xmlns:o="urn:schemas-microsoft-com:office:office" xmlns:v="urn:schemas-microsoft-com:vml" xmlns:pvml="urn:schemas-microsoft-com:office:powerpoint" xmlns:com="http://schemas.openxmlformats.org/drawingml/2006/compatibility" xmlns:p15="http://schemas.microsoft.com/office/powerpoint/2012/main">
       <p:transition spd="slow">
         <p:fade/>
       </p:transition>
@@ -9251,7 +9251,7 @@
         <p:fade/>
       </p:transition>
     </mc:Choice>
-    <mc:Fallback xmlns:p15="http://schemas.microsoft.com/office/powerpoint/2012/main" xmlns:com="http://schemas.openxmlformats.org/drawingml/2006/compatibility" xmlns:pvml="urn:schemas-microsoft-com:office:powerpoint" xmlns:v="urn:schemas-microsoft-com:vml" xmlns:o="urn:schemas-microsoft-com:office:office" xmlns:dgm="http://schemas.openxmlformats.org/drawingml/2006/diagram" xmlns:c="http://schemas.openxmlformats.org/drawingml/2006/chart" xmlns:mv="urn:schemas-microsoft-com:mac:vml" xmlns="">
+    <mc:Fallback xmlns="" xmlns:mv="urn:schemas-microsoft-com:mac:vml" xmlns:c="http://schemas.openxmlformats.org/drawingml/2006/chart" xmlns:dgm="http://schemas.openxmlformats.org/drawingml/2006/diagram" xmlns:o="urn:schemas-microsoft-com:office:office" xmlns:v="urn:schemas-microsoft-com:vml" xmlns:pvml="urn:schemas-microsoft-com:office:powerpoint" xmlns:com="http://schemas.openxmlformats.org/drawingml/2006/compatibility" xmlns:p15="http://schemas.microsoft.com/office/powerpoint/2012/main">
       <p:transition spd="slow">
         <p:fade/>
       </p:transition>
@@ -10499,7 +10499,7 @@
         <p:fade/>
       </p:transition>
     </mc:Choice>
-    <mc:Fallback xmlns:p15="http://schemas.microsoft.com/office/powerpoint/2012/main" xmlns:com="http://schemas.openxmlformats.org/drawingml/2006/compatibility" xmlns:pvml="urn:schemas-microsoft-com:office:powerpoint" xmlns:v="urn:schemas-microsoft-com:vml" xmlns:o="urn:schemas-microsoft-com:office:office" xmlns:dgm="http://schemas.openxmlformats.org/drawingml/2006/diagram" xmlns:c="http://schemas.openxmlformats.org/drawingml/2006/chart" xmlns:mv="urn:schemas-microsoft-com:mac:vml" xmlns="">
+    <mc:Fallback xmlns="" xmlns:mv="urn:schemas-microsoft-com:mac:vml" xmlns:c="http://schemas.openxmlformats.org/drawingml/2006/chart" xmlns:dgm="http://schemas.openxmlformats.org/drawingml/2006/diagram" xmlns:o="urn:schemas-microsoft-com:office:office" xmlns:v="urn:schemas-microsoft-com:vml" xmlns:pvml="urn:schemas-microsoft-com:office:powerpoint" xmlns:com="http://schemas.openxmlformats.org/drawingml/2006/compatibility" xmlns:p15="http://schemas.microsoft.com/office/powerpoint/2012/main">
       <p:transition spd="slow">
         <p:fade/>
       </p:transition>
@@ -12225,7 +12225,7 @@
         <p:fade/>
       </p:transition>
     </mc:Choice>
-    <mc:Fallback xmlns:p15="http://schemas.microsoft.com/office/powerpoint/2012/main" xmlns:com="http://schemas.openxmlformats.org/drawingml/2006/compatibility" xmlns:pvml="urn:schemas-microsoft-com:office:powerpoint" xmlns:v="urn:schemas-microsoft-com:vml" xmlns:o="urn:schemas-microsoft-com:office:office" xmlns:dgm="http://schemas.openxmlformats.org/drawingml/2006/diagram" xmlns:c="http://schemas.openxmlformats.org/drawingml/2006/chart" xmlns:mv="urn:schemas-microsoft-com:mac:vml" xmlns="">
+    <mc:Fallback xmlns="" xmlns:mv="urn:schemas-microsoft-com:mac:vml" xmlns:c="http://schemas.openxmlformats.org/drawingml/2006/chart" xmlns:dgm="http://schemas.openxmlformats.org/drawingml/2006/diagram" xmlns:o="urn:schemas-microsoft-com:office:office" xmlns:v="urn:schemas-microsoft-com:vml" xmlns:pvml="urn:schemas-microsoft-com:office:powerpoint" xmlns:com="http://schemas.openxmlformats.org/drawingml/2006/compatibility" xmlns:p15="http://schemas.microsoft.com/office/powerpoint/2012/main">
       <p:transition spd="slow">
         <p:fade/>
       </p:transition>
@@ -12995,7 +12995,7 @@
         <p:fade/>
       </p:transition>
     </mc:Choice>
-    <mc:Fallback xmlns:p15="http://schemas.microsoft.com/office/powerpoint/2012/main" xmlns:com="http://schemas.openxmlformats.org/drawingml/2006/compatibility" xmlns:pvml="urn:schemas-microsoft-com:office:powerpoint" xmlns:v="urn:schemas-microsoft-com:vml" xmlns:o="urn:schemas-microsoft-com:office:office" xmlns:dgm="http://schemas.openxmlformats.org/drawingml/2006/diagram" xmlns:c="http://schemas.openxmlformats.org/drawingml/2006/chart" xmlns:mv="urn:schemas-microsoft-com:mac:vml" xmlns="">
+    <mc:Fallback xmlns="" xmlns:mv="urn:schemas-microsoft-com:mac:vml" xmlns:c="http://schemas.openxmlformats.org/drawingml/2006/chart" xmlns:dgm="http://schemas.openxmlformats.org/drawingml/2006/diagram" xmlns:o="urn:schemas-microsoft-com:office:office" xmlns:v="urn:schemas-microsoft-com:vml" xmlns:pvml="urn:schemas-microsoft-com:office:powerpoint" xmlns:com="http://schemas.openxmlformats.org/drawingml/2006/compatibility" xmlns:p15="http://schemas.microsoft.com/office/powerpoint/2012/main">
       <p:transition spd="slow">
         <p:fade/>
       </p:transition>
@@ -13622,7 +13622,7 @@
         <p:fade/>
       </p:transition>
     </mc:Choice>
-    <mc:Fallback xmlns:p15="http://schemas.microsoft.com/office/powerpoint/2012/main" xmlns:com="http://schemas.openxmlformats.org/drawingml/2006/compatibility" xmlns:pvml="urn:schemas-microsoft-com:office:powerpoint" xmlns:v="urn:schemas-microsoft-com:vml" xmlns:o="urn:schemas-microsoft-com:office:office" xmlns:dgm="http://schemas.openxmlformats.org/drawingml/2006/diagram" xmlns:c="http://schemas.openxmlformats.org/drawingml/2006/chart" xmlns:mv="urn:schemas-microsoft-com:mac:vml" xmlns="">
+    <mc:Fallback xmlns="" xmlns:mv="urn:schemas-microsoft-com:mac:vml" xmlns:c="http://schemas.openxmlformats.org/drawingml/2006/chart" xmlns:dgm="http://schemas.openxmlformats.org/drawingml/2006/diagram" xmlns:o="urn:schemas-microsoft-com:office:office" xmlns:v="urn:schemas-microsoft-com:vml" xmlns:pvml="urn:schemas-microsoft-com:office:powerpoint" xmlns:com="http://schemas.openxmlformats.org/drawingml/2006/compatibility" xmlns:p15="http://schemas.microsoft.com/office/powerpoint/2012/main">
       <p:transition spd="slow">
         <p:fade/>
       </p:transition>
@@ -14977,7 +14977,7 @@
         <p:fade/>
       </p:transition>
     </mc:Choice>
-    <mc:Fallback xmlns:p15="http://schemas.microsoft.com/office/powerpoint/2012/main" xmlns:com="http://schemas.openxmlformats.org/drawingml/2006/compatibility" xmlns:pvml="urn:schemas-microsoft-com:office:powerpoint" xmlns:v="urn:schemas-microsoft-com:vml" xmlns:o="urn:schemas-microsoft-com:office:office" xmlns:dgm="http://schemas.openxmlformats.org/drawingml/2006/diagram" xmlns:c="http://schemas.openxmlformats.org/drawingml/2006/chart" xmlns:mv="urn:schemas-microsoft-com:mac:vml" xmlns="">
+    <mc:Fallback xmlns="" xmlns:mv="urn:schemas-microsoft-com:mac:vml" xmlns:c="http://schemas.openxmlformats.org/drawingml/2006/chart" xmlns:dgm="http://schemas.openxmlformats.org/drawingml/2006/diagram" xmlns:o="urn:schemas-microsoft-com:office:office" xmlns:v="urn:schemas-microsoft-com:vml" xmlns:pvml="urn:schemas-microsoft-com:office:powerpoint" xmlns:com="http://schemas.openxmlformats.org/drawingml/2006/compatibility" xmlns:p15="http://schemas.microsoft.com/office/powerpoint/2012/main">
       <p:transition spd="slow">
         <p:fade/>
       </p:transition>
@@ -16380,7 +16380,7 @@
         <p:fade/>
       </p:transition>
     </mc:Choice>
-    <mc:Fallback xmlns:p15="http://schemas.microsoft.com/office/powerpoint/2012/main" xmlns:com="http://schemas.openxmlformats.org/drawingml/2006/compatibility" xmlns:pvml="urn:schemas-microsoft-com:office:powerpoint" xmlns:v="urn:schemas-microsoft-com:vml" xmlns:o="urn:schemas-microsoft-com:office:office" xmlns:dgm="http://schemas.openxmlformats.org/drawingml/2006/diagram" xmlns:c="http://schemas.openxmlformats.org/drawingml/2006/chart" xmlns:mv="urn:schemas-microsoft-com:mac:vml" xmlns="">
+    <mc:Fallback xmlns="" xmlns:mv="urn:schemas-microsoft-com:mac:vml" xmlns:c="http://schemas.openxmlformats.org/drawingml/2006/chart" xmlns:dgm="http://schemas.openxmlformats.org/drawingml/2006/diagram" xmlns:o="urn:schemas-microsoft-com:office:office" xmlns:v="urn:schemas-microsoft-com:vml" xmlns:pvml="urn:schemas-microsoft-com:office:powerpoint" xmlns:com="http://schemas.openxmlformats.org/drawingml/2006/compatibility" xmlns:p15="http://schemas.microsoft.com/office/powerpoint/2012/main">
       <p:transition spd="slow">
         <p:fade/>
       </p:transition>
@@ -17518,7 +17518,7 @@
         <p:fade/>
       </p:transition>
     </mc:Choice>
-    <mc:Fallback xmlns:p15="http://schemas.microsoft.com/office/powerpoint/2012/main" xmlns:com="http://schemas.openxmlformats.org/drawingml/2006/compatibility" xmlns:pvml="urn:schemas-microsoft-com:office:powerpoint" xmlns:v="urn:schemas-microsoft-com:vml" xmlns:o="urn:schemas-microsoft-com:office:office" xmlns:dgm="http://schemas.openxmlformats.org/drawingml/2006/diagram" xmlns:c="http://schemas.openxmlformats.org/drawingml/2006/chart" xmlns:mv="urn:schemas-microsoft-com:mac:vml" xmlns="">
+    <mc:Fallback xmlns="" xmlns:mv="urn:schemas-microsoft-com:mac:vml" xmlns:c="http://schemas.openxmlformats.org/drawingml/2006/chart" xmlns:dgm="http://schemas.openxmlformats.org/drawingml/2006/diagram" xmlns:o="urn:schemas-microsoft-com:office:office" xmlns:v="urn:schemas-microsoft-com:vml" xmlns:pvml="urn:schemas-microsoft-com:office:powerpoint" xmlns:com="http://schemas.openxmlformats.org/drawingml/2006/compatibility" xmlns:p15="http://schemas.microsoft.com/office/powerpoint/2012/main">
       <p:transition spd="slow">
         <p:fade/>
       </p:transition>
@@ -18592,7 +18592,7 @@
         <p:fade/>
       </p:transition>
     </mc:Choice>
-    <mc:Fallback xmlns:p15="http://schemas.microsoft.com/office/powerpoint/2012/main" xmlns:com="http://schemas.openxmlformats.org/drawingml/2006/compatibility" xmlns:pvml="urn:schemas-microsoft-com:office:powerpoint" xmlns:v="urn:schemas-microsoft-com:vml" xmlns:o="urn:schemas-microsoft-com:office:office" xmlns:dgm="http://schemas.openxmlformats.org/drawingml/2006/diagram" xmlns:c="http://schemas.openxmlformats.org/drawingml/2006/chart" xmlns:mv="urn:schemas-microsoft-com:mac:vml" xmlns="">
+    <mc:Fallback xmlns="" xmlns:mv="urn:schemas-microsoft-com:mac:vml" xmlns:c="http://schemas.openxmlformats.org/drawingml/2006/chart" xmlns:dgm="http://schemas.openxmlformats.org/drawingml/2006/diagram" xmlns:o="urn:schemas-microsoft-com:office:office" xmlns:v="urn:schemas-microsoft-com:vml" xmlns:pvml="urn:schemas-microsoft-com:office:powerpoint" xmlns:com="http://schemas.openxmlformats.org/drawingml/2006/compatibility" xmlns:p15="http://schemas.microsoft.com/office/powerpoint/2012/main">
       <p:transition spd="slow">
         <p:fade/>
       </p:transition>
@@ -18900,33 +18900,6 @@
       </p:pic>
       <p:pic>
         <p:nvPicPr>
-          <p:cNvPr id="192" name="Democrat"/>
-          <p:cNvPicPr preferRelativeResize="0"/>
-          <p:nvPr/>
-        </p:nvPicPr>
-        <p:blipFill rotWithShape="1">
-          <a:blip r:embed="rId5">
-            <a:alphaModFix/>
-          </a:blip>
-          <a:srcRect/>
-          <a:stretch/>
-        </p:blipFill>
-        <p:spPr>
-          <a:xfrm>
-            <a:off x="9359223" y="1399979"/>
-            <a:ext cx="2239575" cy="4603810"/>
-          </a:xfrm>
-          <a:prstGeom prst="rect">
-            <a:avLst/>
-          </a:prstGeom>
-          <a:noFill/>
-          <a:ln>
-            <a:noFill/>
-          </a:ln>
-        </p:spPr>
-      </p:pic>
-      <p:pic>
-        <p:nvPicPr>
           <p:cNvPr id="2" name="Picture 1"/>
           <p:cNvPicPr>
             <a:picLocks noChangeAspect="1"/>
@@ -18934,7 +18907,7 @@
           <p:nvPr/>
         </p:nvPicPr>
         <p:blipFill>
-          <a:blip r:embed="rId6">
+          <a:blip r:embed="rId5">
             <a:extLst>
               <a:ext uri="{28A0092B-C50C-407E-A947-70E740481C1C}">
                 <a14:useLocalDpi xmlns:a14="http://schemas.microsoft.com/office/drawing/2010/main" val="0"/>
@@ -18963,7 +18936,7 @@
         </p:nvSpPr>
         <p:spPr>
           <a:xfrm>
-            <a:off x="5281964" y="3107992"/>
+            <a:off x="5281964" y="3812400"/>
             <a:ext cx="2316480" cy="778208"/>
           </a:xfrm>
           <a:prstGeom prst="ellipse">
@@ -19047,6 +19020,36 @@
           </a:p>
         </p:txBody>
       </p:sp>
+      <p:pic>
+        <p:nvPicPr>
+          <p:cNvPr id="4" name="Democrat"/>
+          <p:cNvPicPr>
+            <a:picLocks noChangeAspect="1"/>
+          </p:cNvPicPr>
+          <p:nvPr/>
+        </p:nvPicPr>
+        <p:blipFill>
+          <a:blip r:embed="rId6">
+            <a:extLst>
+              <a:ext uri="{28A0092B-C50C-407E-A947-70E740481C1C}">
+                <a14:useLocalDpi xmlns:a14="http://schemas.microsoft.com/office/drawing/2010/main" val="0"/>
+              </a:ext>
+            </a:extLst>
+          </a:blip>
+          <a:stretch>
+            <a:fillRect/>
+          </a:stretch>
+        </p:blipFill>
+        <p:spPr>
+          <a:xfrm>
+            <a:off x="9319818" y="1417638"/>
+            <a:ext cx="2589644" cy="4603810"/>
+          </a:xfrm>
+          <a:prstGeom prst="rect">
+            <a:avLst/>
+          </a:prstGeom>
+        </p:spPr>
+      </p:pic>
     </p:spTree>
   </p:cSld>
   <p:clrMapOvr>
@@ -19058,7 +19061,7 @@
         <p:fade/>
       </p:transition>
     </mc:Choice>
-    <mc:Fallback xmlns:p15="http://schemas.microsoft.com/office/powerpoint/2012/main" xmlns:com="http://schemas.openxmlformats.org/drawingml/2006/compatibility" xmlns:pvml="urn:schemas-microsoft-com:office:powerpoint" xmlns:v="urn:schemas-microsoft-com:vml" xmlns:o="urn:schemas-microsoft-com:office:office" xmlns:dgm="http://schemas.openxmlformats.org/drawingml/2006/diagram" xmlns:c="http://schemas.openxmlformats.org/drawingml/2006/chart" xmlns:mv="urn:schemas-microsoft-com:mac:vml" xmlns="">
+    <mc:Fallback xmlns="" xmlns:mv="urn:schemas-microsoft-com:mac:vml" xmlns:c="http://schemas.openxmlformats.org/drawingml/2006/chart" xmlns:dgm="http://schemas.openxmlformats.org/drawingml/2006/diagram" xmlns:o="urn:schemas-microsoft-com:office:office" xmlns:v="urn:schemas-microsoft-com:vml" xmlns:pvml="urn:schemas-microsoft-com:office:powerpoint" xmlns:com="http://schemas.openxmlformats.org/drawingml/2006/compatibility" xmlns:p15="http://schemas.microsoft.com/office/powerpoint/2012/main">
       <p:transition spd="slow">
         <p:fade/>
       </p:transition>
@@ -19385,7 +19388,7 @@
                                           </p:stCondLst>
                                         </p:cTn>
                                         <p:tgtEl>
-                                          <p:spTgt spid="192"/>
+                                          <p:spTgt spid="4"/>
                                         </p:tgtEl>
                                         <p:attrNameLst>
                                           <p:attrName>style.visibility</p:attrName>
@@ -19399,7 +19402,7 @@
                                       <p:cBhvr>
                                         <p:cTn id="29" dur="500"/>
                                         <p:tgtEl>
-                                          <p:spTgt spid="192"/>
+                                          <p:spTgt spid="4"/>
                                         </p:tgtEl>
                                       </p:cBhvr>
                                     </p:animEffect>
@@ -19409,7 +19412,7 @@
                                       <p:cBhvr override="childStyle">
                                         <p:cTn dur="1" fill="hold" display="0" masterRel="nextClick" afterEffect="1"/>
                                         <p:tgtEl>
-                                          <p:spTgt spid="192"/>
+                                          <p:spTgt spid="4"/>
                                         </p:tgtEl>
                                         <p:attrNameLst>
                                           <p:attrName>style.visibility</p:attrName>
@@ -20500,7 +20503,7 @@
         <p:fade/>
       </p:transition>
     </mc:Choice>
-    <mc:Fallback xmlns:p15="http://schemas.microsoft.com/office/powerpoint/2012/main" xmlns:com="http://schemas.openxmlformats.org/drawingml/2006/compatibility" xmlns:pvml="urn:schemas-microsoft-com:office:powerpoint" xmlns:v="urn:schemas-microsoft-com:vml" xmlns:o="urn:schemas-microsoft-com:office:office" xmlns:dgm="http://schemas.openxmlformats.org/drawingml/2006/diagram" xmlns:c="http://schemas.openxmlformats.org/drawingml/2006/chart" xmlns:mv="urn:schemas-microsoft-com:mac:vml" xmlns="">
+    <mc:Fallback xmlns="" xmlns:mv="urn:schemas-microsoft-com:mac:vml" xmlns:c="http://schemas.openxmlformats.org/drawingml/2006/chart" xmlns:dgm="http://schemas.openxmlformats.org/drawingml/2006/diagram" xmlns:o="urn:schemas-microsoft-com:office:office" xmlns:v="urn:schemas-microsoft-com:vml" xmlns:pvml="urn:schemas-microsoft-com:office:powerpoint" xmlns:com="http://schemas.openxmlformats.org/drawingml/2006/compatibility" xmlns:p15="http://schemas.microsoft.com/office/powerpoint/2012/main">
       <p:transition spd="slow">
         <p:fade/>
       </p:transition>
@@ -20642,7 +20645,7 @@
         <p:fade/>
       </p:transition>
     </mc:Choice>
-    <mc:Fallback xmlns:p15="http://schemas.microsoft.com/office/powerpoint/2012/main" xmlns:com="http://schemas.openxmlformats.org/drawingml/2006/compatibility" xmlns:pvml="urn:schemas-microsoft-com:office:powerpoint" xmlns:v="urn:schemas-microsoft-com:vml" xmlns:o="urn:schemas-microsoft-com:office:office" xmlns:dgm="http://schemas.openxmlformats.org/drawingml/2006/diagram" xmlns:c="http://schemas.openxmlformats.org/drawingml/2006/chart" xmlns:mv="urn:schemas-microsoft-com:mac:vml" xmlns="">
+    <mc:Fallback xmlns="" xmlns:mv="urn:schemas-microsoft-com:mac:vml" xmlns:c="http://schemas.openxmlformats.org/drawingml/2006/chart" xmlns:dgm="http://schemas.openxmlformats.org/drawingml/2006/diagram" xmlns:o="urn:schemas-microsoft-com:office:office" xmlns:v="urn:schemas-microsoft-com:vml" xmlns:pvml="urn:schemas-microsoft-com:office:powerpoint" xmlns:com="http://schemas.openxmlformats.org/drawingml/2006/compatibility" xmlns:p15="http://schemas.microsoft.com/office/powerpoint/2012/main">
       <p:transition spd="slow">
         <p:fade/>
       </p:transition>
@@ -20784,7 +20787,7 @@
         <p:fade/>
       </p:transition>
     </mc:Choice>
-    <mc:Fallback xmlns:p15="http://schemas.microsoft.com/office/powerpoint/2012/main" xmlns:com="http://schemas.openxmlformats.org/drawingml/2006/compatibility" xmlns:pvml="urn:schemas-microsoft-com:office:powerpoint" xmlns:v="urn:schemas-microsoft-com:vml" xmlns:o="urn:schemas-microsoft-com:office:office" xmlns:dgm="http://schemas.openxmlformats.org/drawingml/2006/diagram" xmlns:c="http://schemas.openxmlformats.org/drawingml/2006/chart" xmlns:mv="urn:schemas-microsoft-com:mac:vml" xmlns="">
+    <mc:Fallback xmlns="" xmlns:mv="urn:schemas-microsoft-com:mac:vml" xmlns:c="http://schemas.openxmlformats.org/drawingml/2006/chart" xmlns:dgm="http://schemas.openxmlformats.org/drawingml/2006/diagram" xmlns:o="urn:schemas-microsoft-com:office:office" xmlns:v="urn:schemas-microsoft-com:vml" xmlns:pvml="urn:schemas-microsoft-com:office:powerpoint" xmlns:com="http://schemas.openxmlformats.org/drawingml/2006/compatibility" xmlns:p15="http://schemas.microsoft.com/office/powerpoint/2012/main">
       <p:transition spd="slow">
         <p:fade/>
       </p:transition>
@@ -20978,7 +20981,7 @@
         <p:fade/>
       </p:transition>
     </mc:Choice>
-    <mc:Fallback xmlns:p15="http://schemas.microsoft.com/office/powerpoint/2012/main" xmlns:com="http://schemas.openxmlformats.org/drawingml/2006/compatibility" xmlns:pvml="urn:schemas-microsoft-com:office:powerpoint" xmlns:v="urn:schemas-microsoft-com:vml" xmlns:o="urn:schemas-microsoft-com:office:office" xmlns:dgm="http://schemas.openxmlformats.org/drawingml/2006/diagram" xmlns:c="http://schemas.openxmlformats.org/drawingml/2006/chart" xmlns:mv="urn:schemas-microsoft-com:mac:vml" xmlns="">
+    <mc:Fallback xmlns="" xmlns:mv="urn:schemas-microsoft-com:mac:vml" xmlns:c="http://schemas.openxmlformats.org/drawingml/2006/chart" xmlns:dgm="http://schemas.openxmlformats.org/drawingml/2006/diagram" xmlns:o="urn:schemas-microsoft-com:office:office" xmlns:v="urn:schemas-microsoft-com:vml" xmlns:pvml="urn:schemas-microsoft-com:office:powerpoint" xmlns:com="http://schemas.openxmlformats.org/drawingml/2006/compatibility" xmlns:p15="http://schemas.microsoft.com/office/powerpoint/2012/main">
       <p:transition spd="slow">
         <p:fade/>
       </p:transition>
@@ -21301,7 +21304,7 @@
         <p:fade/>
       </p:transition>
     </mc:Choice>
-    <mc:Fallback xmlns:p15="http://schemas.microsoft.com/office/powerpoint/2012/main" xmlns:com="http://schemas.openxmlformats.org/drawingml/2006/compatibility" xmlns:pvml="urn:schemas-microsoft-com:office:powerpoint" xmlns:v="urn:schemas-microsoft-com:vml" xmlns:o="urn:schemas-microsoft-com:office:office" xmlns:dgm="http://schemas.openxmlformats.org/drawingml/2006/diagram" xmlns:c="http://schemas.openxmlformats.org/drawingml/2006/chart" xmlns:mv="urn:schemas-microsoft-com:mac:vml" xmlns="">
+    <mc:Fallback xmlns="" xmlns:mv="urn:schemas-microsoft-com:mac:vml" xmlns:c="http://schemas.openxmlformats.org/drawingml/2006/chart" xmlns:dgm="http://schemas.openxmlformats.org/drawingml/2006/diagram" xmlns:o="urn:schemas-microsoft-com:office:office" xmlns:v="urn:schemas-microsoft-com:vml" xmlns:pvml="urn:schemas-microsoft-com:office:powerpoint" xmlns:com="http://schemas.openxmlformats.org/drawingml/2006/compatibility" xmlns:p15="http://schemas.microsoft.com/office/powerpoint/2012/main">
       <p:transition spd="slow">
         <p:fade/>
       </p:transition>
@@ -21649,7 +21652,7 @@
         <p:fade/>
       </p:transition>
     </mc:Choice>
-    <mc:Fallback xmlns:p15="http://schemas.microsoft.com/office/powerpoint/2012/main" xmlns:com="http://schemas.openxmlformats.org/drawingml/2006/compatibility" xmlns:pvml="urn:schemas-microsoft-com:office:powerpoint" xmlns:v="urn:schemas-microsoft-com:vml" xmlns:o="urn:schemas-microsoft-com:office:office" xmlns:dgm="http://schemas.openxmlformats.org/drawingml/2006/diagram" xmlns:c="http://schemas.openxmlformats.org/drawingml/2006/chart" xmlns:mv="urn:schemas-microsoft-com:mac:vml" xmlns="">
+    <mc:Fallback xmlns="" xmlns:mv="urn:schemas-microsoft-com:mac:vml" xmlns:c="http://schemas.openxmlformats.org/drawingml/2006/chart" xmlns:dgm="http://schemas.openxmlformats.org/drawingml/2006/diagram" xmlns:o="urn:schemas-microsoft-com:office:office" xmlns:v="urn:schemas-microsoft-com:vml" xmlns:pvml="urn:schemas-microsoft-com:office:powerpoint" xmlns:com="http://schemas.openxmlformats.org/drawingml/2006/compatibility" xmlns:p15="http://schemas.microsoft.com/office/powerpoint/2012/main">
       <p:transition spd="slow">
         <p:fade/>
       </p:transition>
@@ -21972,7 +21975,7 @@
         <p:fade/>
       </p:transition>
     </mc:Choice>
-    <mc:Fallback xmlns:p15="http://schemas.microsoft.com/office/powerpoint/2012/main" xmlns:com="http://schemas.openxmlformats.org/drawingml/2006/compatibility" xmlns:pvml="urn:schemas-microsoft-com:office:powerpoint" xmlns:v="urn:schemas-microsoft-com:vml" xmlns:o="urn:schemas-microsoft-com:office:office" xmlns:dgm="http://schemas.openxmlformats.org/drawingml/2006/diagram" xmlns:c="http://schemas.openxmlformats.org/drawingml/2006/chart" xmlns:mv="urn:schemas-microsoft-com:mac:vml" xmlns="">
+    <mc:Fallback xmlns="" xmlns:mv="urn:schemas-microsoft-com:mac:vml" xmlns:c="http://schemas.openxmlformats.org/drawingml/2006/chart" xmlns:dgm="http://schemas.openxmlformats.org/drawingml/2006/diagram" xmlns:o="urn:schemas-microsoft-com:office:office" xmlns:v="urn:schemas-microsoft-com:vml" xmlns:pvml="urn:schemas-microsoft-com:office:powerpoint" xmlns:com="http://schemas.openxmlformats.org/drawingml/2006/compatibility" xmlns:p15="http://schemas.microsoft.com/office/powerpoint/2012/main">
       <p:transition spd="slow">
         <p:fade/>
       </p:transition>
@@ -22274,7 +22277,7 @@
         <p:fade/>
       </p:transition>
     </mc:Choice>
-    <mc:Fallback xmlns:p15="http://schemas.microsoft.com/office/powerpoint/2012/main" xmlns:com="http://schemas.openxmlformats.org/drawingml/2006/compatibility" xmlns:pvml="urn:schemas-microsoft-com:office:powerpoint" xmlns:v="urn:schemas-microsoft-com:vml" xmlns:o="urn:schemas-microsoft-com:office:office" xmlns:dgm="http://schemas.openxmlformats.org/drawingml/2006/diagram" xmlns:c="http://schemas.openxmlformats.org/drawingml/2006/chart" xmlns:mv="urn:schemas-microsoft-com:mac:vml" xmlns="">
+    <mc:Fallback xmlns="" xmlns:mv="urn:schemas-microsoft-com:mac:vml" xmlns:c="http://schemas.openxmlformats.org/drawingml/2006/chart" xmlns:dgm="http://schemas.openxmlformats.org/drawingml/2006/diagram" xmlns:o="urn:schemas-microsoft-com:office:office" xmlns:v="urn:schemas-microsoft-com:vml" xmlns:pvml="urn:schemas-microsoft-com:office:powerpoint" xmlns:com="http://schemas.openxmlformats.org/drawingml/2006/compatibility" xmlns:p15="http://schemas.microsoft.com/office/powerpoint/2012/main">
       <p:transition spd="slow">
         <p:fade/>
       </p:transition>
@@ -22585,7 +22588,7 @@
         <p:fade/>
       </p:transition>
     </mc:Choice>
-    <mc:Fallback xmlns:p15="http://schemas.microsoft.com/office/powerpoint/2012/main" xmlns:com="http://schemas.openxmlformats.org/drawingml/2006/compatibility" xmlns:pvml="urn:schemas-microsoft-com:office:powerpoint" xmlns:v="urn:schemas-microsoft-com:vml" xmlns:o="urn:schemas-microsoft-com:office:office" xmlns:dgm="http://schemas.openxmlformats.org/drawingml/2006/diagram" xmlns:c="http://schemas.openxmlformats.org/drawingml/2006/chart" xmlns:mv="urn:schemas-microsoft-com:mac:vml" xmlns="">
+    <mc:Fallback xmlns="" xmlns:mv="urn:schemas-microsoft-com:mac:vml" xmlns:c="http://schemas.openxmlformats.org/drawingml/2006/chart" xmlns:dgm="http://schemas.openxmlformats.org/drawingml/2006/diagram" xmlns:o="urn:schemas-microsoft-com:office:office" xmlns:v="urn:schemas-microsoft-com:vml" xmlns:pvml="urn:schemas-microsoft-com:office:powerpoint" xmlns:com="http://schemas.openxmlformats.org/drawingml/2006/compatibility" xmlns:p15="http://schemas.microsoft.com/office/powerpoint/2012/main">
       <p:transition spd="slow">
         <p:fade/>
       </p:transition>
@@ -22908,7 +22911,7 @@
         <p:fade/>
       </p:transition>
     </mc:Choice>
-    <mc:Fallback xmlns:p15="http://schemas.microsoft.com/office/powerpoint/2012/main" xmlns:com="http://schemas.openxmlformats.org/drawingml/2006/compatibility" xmlns:pvml="urn:schemas-microsoft-com:office:powerpoint" xmlns:v="urn:schemas-microsoft-com:vml" xmlns:o="urn:schemas-microsoft-com:office:office" xmlns:dgm="http://schemas.openxmlformats.org/drawingml/2006/diagram" xmlns:c="http://schemas.openxmlformats.org/drawingml/2006/chart" xmlns:mv="urn:schemas-microsoft-com:mac:vml" xmlns="">
+    <mc:Fallback xmlns="" xmlns:mv="urn:schemas-microsoft-com:mac:vml" xmlns:c="http://schemas.openxmlformats.org/drawingml/2006/chart" xmlns:dgm="http://schemas.openxmlformats.org/drawingml/2006/diagram" xmlns:o="urn:schemas-microsoft-com:office:office" xmlns:v="urn:schemas-microsoft-com:vml" xmlns:pvml="urn:schemas-microsoft-com:office:powerpoint" xmlns:com="http://schemas.openxmlformats.org/drawingml/2006/compatibility" xmlns:p15="http://schemas.microsoft.com/office/powerpoint/2012/main">
       <p:transition spd="slow">
         <p:fade/>
       </p:transition>
@@ -23273,7 +23276,7 @@
         <p:fade/>
       </p:transition>
     </mc:Choice>
-    <mc:Fallback xmlns:p15="http://schemas.microsoft.com/office/powerpoint/2012/main" xmlns:com="http://schemas.openxmlformats.org/drawingml/2006/compatibility" xmlns:pvml="urn:schemas-microsoft-com:office:powerpoint" xmlns:v="urn:schemas-microsoft-com:vml" xmlns:o="urn:schemas-microsoft-com:office:office" xmlns:dgm="http://schemas.openxmlformats.org/drawingml/2006/diagram" xmlns:c="http://schemas.openxmlformats.org/drawingml/2006/chart" xmlns:mv="urn:schemas-microsoft-com:mac:vml" xmlns="">
+    <mc:Fallback xmlns="" xmlns:mv="urn:schemas-microsoft-com:mac:vml" xmlns:c="http://schemas.openxmlformats.org/drawingml/2006/chart" xmlns:dgm="http://schemas.openxmlformats.org/drawingml/2006/diagram" xmlns:o="urn:schemas-microsoft-com:office:office" xmlns:v="urn:schemas-microsoft-com:vml" xmlns:pvml="urn:schemas-microsoft-com:office:powerpoint" xmlns:com="http://schemas.openxmlformats.org/drawingml/2006/compatibility" xmlns:p15="http://schemas.microsoft.com/office/powerpoint/2012/main">
       <p:transition spd="slow">
         <p:fade/>
       </p:transition>
@@ -23596,7 +23599,7 @@
         <p:fade/>
       </p:transition>
     </mc:Choice>
-    <mc:Fallback xmlns:p15="http://schemas.microsoft.com/office/powerpoint/2012/main" xmlns:com="http://schemas.openxmlformats.org/drawingml/2006/compatibility" xmlns:pvml="urn:schemas-microsoft-com:office:powerpoint" xmlns:v="urn:schemas-microsoft-com:vml" xmlns:o="urn:schemas-microsoft-com:office:office" xmlns:dgm="http://schemas.openxmlformats.org/drawingml/2006/diagram" xmlns:c="http://schemas.openxmlformats.org/drawingml/2006/chart" xmlns:mv="urn:schemas-microsoft-com:mac:vml" xmlns="">
+    <mc:Fallback xmlns="" xmlns:mv="urn:schemas-microsoft-com:mac:vml" xmlns:c="http://schemas.openxmlformats.org/drawingml/2006/chart" xmlns:dgm="http://schemas.openxmlformats.org/drawingml/2006/diagram" xmlns:o="urn:schemas-microsoft-com:office:office" xmlns:v="urn:schemas-microsoft-com:vml" xmlns:pvml="urn:schemas-microsoft-com:office:powerpoint" xmlns:com="http://schemas.openxmlformats.org/drawingml/2006/compatibility" xmlns:p15="http://schemas.microsoft.com/office/powerpoint/2012/main">
       <p:transition spd="slow">
         <p:fade/>
       </p:transition>
@@ -23894,7 +23897,7 @@
         <p:fade/>
       </p:transition>
     </mc:Choice>
-    <mc:Fallback xmlns:p15="http://schemas.microsoft.com/office/powerpoint/2012/main" xmlns:com="http://schemas.openxmlformats.org/drawingml/2006/compatibility" xmlns:pvml="urn:schemas-microsoft-com:office:powerpoint" xmlns:v="urn:schemas-microsoft-com:vml" xmlns:o="urn:schemas-microsoft-com:office:office" xmlns:dgm="http://schemas.openxmlformats.org/drawingml/2006/diagram" xmlns:c="http://schemas.openxmlformats.org/drawingml/2006/chart" xmlns:mv="urn:schemas-microsoft-com:mac:vml" xmlns="">
+    <mc:Fallback xmlns="" xmlns:mv="urn:schemas-microsoft-com:mac:vml" xmlns:c="http://schemas.openxmlformats.org/drawingml/2006/chart" xmlns:dgm="http://schemas.openxmlformats.org/drawingml/2006/diagram" xmlns:o="urn:schemas-microsoft-com:office:office" xmlns:v="urn:schemas-microsoft-com:vml" xmlns:pvml="urn:schemas-microsoft-com:office:powerpoint" xmlns:com="http://schemas.openxmlformats.org/drawingml/2006/compatibility" xmlns:p15="http://schemas.microsoft.com/office/powerpoint/2012/main">
       <p:transition spd="slow">
         <p:fade/>
       </p:transition>
@@ -24234,7 +24237,7 @@
         <p:fade/>
       </p:transition>
     </mc:Choice>
-    <mc:Fallback xmlns:p15="http://schemas.microsoft.com/office/powerpoint/2012/main" xmlns:com="http://schemas.openxmlformats.org/drawingml/2006/compatibility" xmlns:pvml="urn:schemas-microsoft-com:office:powerpoint" xmlns:v="urn:schemas-microsoft-com:vml" xmlns:o="urn:schemas-microsoft-com:office:office" xmlns:dgm="http://schemas.openxmlformats.org/drawingml/2006/diagram" xmlns:c="http://schemas.openxmlformats.org/drawingml/2006/chart" xmlns:mv="urn:schemas-microsoft-com:mac:vml" xmlns="">
+    <mc:Fallback xmlns="" xmlns:mv="urn:schemas-microsoft-com:mac:vml" xmlns:c="http://schemas.openxmlformats.org/drawingml/2006/chart" xmlns:dgm="http://schemas.openxmlformats.org/drawingml/2006/diagram" xmlns:o="urn:schemas-microsoft-com:office:office" xmlns:v="urn:schemas-microsoft-com:vml" xmlns:pvml="urn:schemas-microsoft-com:office:powerpoint" xmlns:com="http://schemas.openxmlformats.org/drawingml/2006/compatibility" xmlns:p15="http://schemas.microsoft.com/office/powerpoint/2012/main">
       <p:transition spd="slow">
         <p:fade/>
       </p:transition>
@@ -24549,7 +24552,7 @@
         <p:fade/>
       </p:transition>
     </mc:Choice>
-    <mc:Fallback xmlns:p15="http://schemas.microsoft.com/office/powerpoint/2012/main" xmlns:com="http://schemas.openxmlformats.org/drawingml/2006/compatibility" xmlns:pvml="urn:schemas-microsoft-com:office:powerpoint" xmlns:v="urn:schemas-microsoft-com:vml" xmlns:o="urn:schemas-microsoft-com:office:office" xmlns:dgm="http://schemas.openxmlformats.org/drawingml/2006/diagram" xmlns:c="http://schemas.openxmlformats.org/drawingml/2006/chart" xmlns:mv="urn:schemas-microsoft-com:mac:vml" xmlns="">
+    <mc:Fallback xmlns="" xmlns:mv="urn:schemas-microsoft-com:mac:vml" xmlns:c="http://schemas.openxmlformats.org/drawingml/2006/chart" xmlns:dgm="http://schemas.openxmlformats.org/drawingml/2006/diagram" xmlns:o="urn:schemas-microsoft-com:office:office" xmlns:v="urn:schemas-microsoft-com:vml" xmlns:pvml="urn:schemas-microsoft-com:office:powerpoint" xmlns:com="http://schemas.openxmlformats.org/drawingml/2006/compatibility" xmlns:p15="http://schemas.microsoft.com/office/powerpoint/2012/main">
       <p:transition spd="slow">
         <p:fade/>
       </p:transition>
@@ -25184,33 +25187,6 @@
           </a:fontRef>
         </p:style>
       </p:cxnSp>
-      <p:pic>
-        <p:nvPicPr>
-          <p:cNvPr id="156" name="Google Shape;156;p19"/>
-          <p:cNvPicPr preferRelativeResize="0"/>
-          <p:nvPr/>
-        </p:nvPicPr>
-        <p:blipFill rotWithShape="1">
-          <a:blip r:embed="rId9">
-            <a:alphaModFix/>
-          </a:blip>
-          <a:srcRect/>
-          <a:stretch/>
-        </p:blipFill>
-        <p:spPr>
-          <a:xfrm>
-            <a:off x="8714010" y="4409088"/>
-            <a:ext cx="1008941" cy="2074042"/>
-          </a:xfrm>
-          <a:prstGeom prst="rect">
-            <a:avLst/>
-          </a:prstGeom>
-          <a:noFill/>
-          <a:ln>
-            <a:noFill/>
-          </a:ln>
-        </p:spPr>
-      </p:pic>
       <p:sp>
         <p:nvSpPr>
           <p:cNvPr id="157" name="Google Shape;157;p19"/>
@@ -25311,7 +25287,7 @@
           <p:nvPr/>
         </p:nvPicPr>
         <p:blipFill>
-          <a:blip r:embed="rId10">
+          <a:blip r:embed="rId9">
             <a:extLst>
               <a:ext uri="{28A0092B-C50C-407E-A947-70E740481C1C}">
                 <a14:useLocalDpi xmlns:a14="http://schemas.microsoft.com/office/drawing/2010/main" val="0"/>
@@ -25341,7 +25317,7 @@
           <p:nvPr/>
         </p:nvPicPr>
         <p:blipFill>
-          <a:blip r:embed="rId11">
+          <a:blip r:embed="rId10">
             <a:extLst>
               <a:ext uri="{28A0092B-C50C-407E-A947-70E740481C1C}">
                 <a14:useLocalDpi xmlns:a14="http://schemas.microsoft.com/office/drawing/2010/main" val="0"/>
@@ -25454,8 +25430,8 @@
         </p:nvSpPr>
         <p:spPr>
           <a:xfrm>
-            <a:off x="5217112" y="1714532"/>
-            <a:ext cx="1237028" cy="533366"/>
+            <a:off x="5217112" y="2072822"/>
+            <a:ext cx="1237028" cy="487306"/>
           </a:xfrm>
           <a:prstGeom prst="ellipse">
             <a:avLst/>
@@ -25497,14 +25473,14 @@
           <p:cNvPr id="28" name="Straight Arrow Connector 27"/>
           <p:cNvCxnSpPr>
             <a:stCxn id="27" idx="6"/>
-            <a:endCxn id="156" idx="1"/>
+            <a:endCxn id="5" idx="1"/>
           </p:cNvCxnSpPr>
           <p:nvPr/>
         </p:nvCxnSpPr>
         <p:spPr>
           <a:xfrm>
-            <a:off x="6454140" y="1981215"/>
-            <a:ext cx="2259870" cy="3464894"/>
+            <a:off x="6454140" y="2316475"/>
+            <a:ext cx="2171493" cy="3129634"/>
           </a:xfrm>
           <a:prstGeom prst="straightConnector1">
             <a:avLst/>
@@ -25540,7 +25516,7 @@
           <p:nvPr/>
         </p:nvPicPr>
         <p:blipFill>
-          <a:blip r:embed="rId12">
+          <a:blip r:embed="rId11">
             <a:extLst>
               <a:ext uri="{28A0092B-C50C-407E-A947-70E740481C1C}">
                 <a14:useLocalDpi xmlns:a14="http://schemas.microsoft.com/office/drawing/2010/main" val="0"/>
@@ -25561,6 +25537,36 @@
           </a:prstGeom>
         </p:spPr>
       </p:pic>
+      <p:pic>
+        <p:nvPicPr>
+          <p:cNvPr id="5" name="Picture 4"/>
+          <p:cNvPicPr>
+            <a:picLocks noChangeAspect="1"/>
+          </p:cNvPicPr>
+          <p:nvPr/>
+        </p:nvPicPr>
+        <p:blipFill>
+          <a:blip r:embed="rId12">
+            <a:extLst>
+              <a:ext uri="{28A0092B-C50C-407E-A947-70E740481C1C}">
+                <a14:useLocalDpi xmlns:a14="http://schemas.microsoft.com/office/drawing/2010/main" val="0"/>
+              </a:ext>
+            </a:extLst>
+          </a:blip>
+          <a:stretch>
+            <a:fillRect/>
+          </a:stretch>
+        </p:blipFill>
+        <p:spPr>
+          <a:xfrm>
+            <a:off x="8625633" y="4406147"/>
+            <a:ext cx="1169957" cy="2079924"/>
+          </a:xfrm>
+          <a:prstGeom prst="rect">
+            <a:avLst/>
+          </a:prstGeom>
+        </p:spPr>
+      </p:pic>
     </p:spTree>
   </p:cSld>
   <p:clrMapOvr>
@@ -25572,7 +25578,7 @@
         <p:fade/>
       </p:transition>
     </mc:Choice>
-    <mc:Fallback xmlns:p15="http://schemas.microsoft.com/office/powerpoint/2012/main" xmlns:com="http://schemas.openxmlformats.org/drawingml/2006/compatibility" xmlns:pvml="urn:schemas-microsoft-com:office:powerpoint" xmlns:v="urn:schemas-microsoft-com:vml" xmlns:o="urn:schemas-microsoft-com:office:office" xmlns:dgm="http://schemas.openxmlformats.org/drawingml/2006/diagram" xmlns:c="http://schemas.openxmlformats.org/drawingml/2006/chart" xmlns:mv="urn:schemas-microsoft-com:mac:vml" xmlns="">
+    <mc:Fallback xmlns="" xmlns:mv="urn:schemas-microsoft-com:mac:vml" xmlns:c="http://schemas.openxmlformats.org/drawingml/2006/chart" xmlns:dgm="http://schemas.openxmlformats.org/drawingml/2006/diagram" xmlns:o="urn:schemas-microsoft-com:office:office" xmlns:v="urn:schemas-microsoft-com:vml" xmlns:pvml="urn:schemas-microsoft-com:office:powerpoint" xmlns:com="http://schemas.openxmlformats.org/drawingml/2006/compatibility" xmlns:p15="http://schemas.microsoft.com/office/powerpoint/2012/main">
       <p:transition spd="slow">
         <p:fade/>
       </p:transition>
@@ -25779,7 +25785,7 @@
         <p:spPr>
           <a:xfrm>
             <a:off x="9047580" y="1347700"/>
-            <a:ext cx="2213915" cy="4551537"/>
+            <a:ext cx="2534820" cy="4551537"/>
           </a:xfrm>
           <a:prstGeom prst="rect">
             <a:avLst/>
@@ -25935,7 +25941,7 @@
         <p:fade/>
       </p:transition>
     </mc:Choice>
-    <mc:Fallback xmlns:p15="http://schemas.microsoft.com/office/powerpoint/2012/main" xmlns:com="http://schemas.openxmlformats.org/drawingml/2006/compatibility" xmlns:pvml="urn:schemas-microsoft-com:office:powerpoint" xmlns:v="urn:schemas-microsoft-com:vml" xmlns:o="urn:schemas-microsoft-com:office:office" xmlns:dgm="http://schemas.openxmlformats.org/drawingml/2006/diagram" xmlns:c="http://schemas.openxmlformats.org/drawingml/2006/chart" xmlns:mv="urn:schemas-microsoft-com:mac:vml" xmlns="">
+    <mc:Fallback xmlns="" xmlns:mv="urn:schemas-microsoft-com:mac:vml" xmlns:c="http://schemas.openxmlformats.org/drawingml/2006/chart" xmlns:dgm="http://schemas.openxmlformats.org/drawingml/2006/diagram" xmlns:o="urn:schemas-microsoft-com:office:office" xmlns:v="urn:schemas-microsoft-com:vml" xmlns:pvml="urn:schemas-microsoft-com:office:powerpoint" xmlns:com="http://schemas.openxmlformats.org/drawingml/2006/compatibility" xmlns:p15="http://schemas.microsoft.com/office/powerpoint/2012/main">
       <p:transition spd="slow">
         <p:fade/>
       </p:transition>
@@ -26604,7 +26610,7 @@
         <p:fade/>
       </p:transition>
     </mc:Choice>
-    <mc:Fallback xmlns:p15="http://schemas.microsoft.com/office/powerpoint/2012/main" xmlns:com="http://schemas.openxmlformats.org/drawingml/2006/compatibility" xmlns:pvml="urn:schemas-microsoft-com:office:powerpoint" xmlns:v="urn:schemas-microsoft-com:vml" xmlns:o="urn:schemas-microsoft-com:office:office" xmlns:dgm="http://schemas.openxmlformats.org/drawingml/2006/diagram" xmlns:c="http://schemas.openxmlformats.org/drawingml/2006/chart" xmlns:mv="urn:schemas-microsoft-com:mac:vml" xmlns="">
+    <mc:Fallback xmlns="" xmlns:mv="urn:schemas-microsoft-com:mac:vml" xmlns:c="http://schemas.openxmlformats.org/drawingml/2006/chart" xmlns:dgm="http://schemas.openxmlformats.org/drawingml/2006/diagram" xmlns:o="urn:schemas-microsoft-com:office:office" xmlns:v="urn:schemas-microsoft-com:vml" xmlns:pvml="urn:schemas-microsoft-com:office:powerpoint" xmlns:com="http://schemas.openxmlformats.org/drawingml/2006/compatibility" xmlns:p15="http://schemas.microsoft.com/office/powerpoint/2012/main">
       <p:transition spd="slow">
         <p:fade/>
       </p:transition>

</xml_diff>

<commit_message>
v3 complete with new rep profile
</commit_message>
<xml_diff>
--- a/presentation/civic_duty_presentation_final_v3.pptx
+++ b/presentation/civic_duty_presentation_final_v3.pptx
@@ -1520,7 +1520,7 @@
               </a:spcAft>
               <a:buNone/>
             </a:pPr>
-            <a:endParaRPr/>
+            <a:endParaRPr dirty="0"/>
           </a:p>
         </p:txBody>
       </p:sp>
@@ -4964,7 +4964,7 @@
         <p:fade/>
       </p:transition>
     </mc:Choice>
-    <mc:Fallback xmlns="" xmlns:mv="urn:schemas-microsoft-com:mac:vml" xmlns:c="http://schemas.openxmlformats.org/drawingml/2006/chart" xmlns:dgm="http://schemas.openxmlformats.org/drawingml/2006/diagram" xmlns:o="urn:schemas-microsoft-com:office:office" xmlns:v="urn:schemas-microsoft-com:vml" xmlns:pvml="urn:schemas-microsoft-com:office:powerpoint" xmlns:com="http://schemas.openxmlformats.org/drawingml/2006/compatibility" xmlns:p15="http://schemas.microsoft.com/office/powerpoint/2012/main">
+    <mc:Fallback xmlns:p15="http://schemas.microsoft.com/office/powerpoint/2012/main" xmlns:com="http://schemas.openxmlformats.org/drawingml/2006/compatibility" xmlns:pvml="urn:schemas-microsoft-com:office:powerpoint" xmlns:v="urn:schemas-microsoft-com:vml" xmlns:o="urn:schemas-microsoft-com:office:office" xmlns:dgm="http://schemas.openxmlformats.org/drawingml/2006/diagram" xmlns:c="http://schemas.openxmlformats.org/drawingml/2006/chart" xmlns:mv="urn:schemas-microsoft-com:mac:vml" xmlns="">
       <p:transition spd="slow">
         <p:fade/>
       </p:transition>
@@ -5973,7 +5973,7 @@
         <p:fade/>
       </p:transition>
     </mc:Choice>
-    <mc:Fallback xmlns="" xmlns:mv="urn:schemas-microsoft-com:mac:vml" xmlns:c="http://schemas.openxmlformats.org/drawingml/2006/chart" xmlns:dgm="http://schemas.openxmlformats.org/drawingml/2006/diagram" xmlns:o="urn:schemas-microsoft-com:office:office" xmlns:v="urn:schemas-microsoft-com:vml" xmlns:pvml="urn:schemas-microsoft-com:office:powerpoint" xmlns:com="http://schemas.openxmlformats.org/drawingml/2006/compatibility" xmlns:p15="http://schemas.microsoft.com/office/powerpoint/2012/main">
+    <mc:Fallback xmlns:p15="http://schemas.microsoft.com/office/powerpoint/2012/main" xmlns:com="http://schemas.openxmlformats.org/drawingml/2006/compatibility" xmlns:pvml="urn:schemas-microsoft-com:office:powerpoint" xmlns:v="urn:schemas-microsoft-com:vml" xmlns:o="urn:schemas-microsoft-com:office:office" xmlns:dgm="http://schemas.openxmlformats.org/drawingml/2006/diagram" xmlns:c="http://schemas.openxmlformats.org/drawingml/2006/chart" xmlns:mv="urn:schemas-microsoft-com:mac:vml" xmlns="">
       <p:transition spd="slow">
         <p:fade/>
       </p:transition>
@@ -6982,7 +6982,7 @@
         <p:fade/>
       </p:transition>
     </mc:Choice>
-    <mc:Fallback xmlns="" xmlns:mv="urn:schemas-microsoft-com:mac:vml" xmlns:c="http://schemas.openxmlformats.org/drawingml/2006/chart" xmlns:dgm="http://schemas.openxmlformats.org/drawingml/2006/diagram" xmlns:o="urn:schemas-microsoft-com:office:office" xmlns:v="urn:schemas-microsoft-com:vml" xmlns:pvml="urn:schemas-microsoft-com:office:powerpoint" xmlns:com="http://schemas.openxmlformats.org/drawingml/2006/compatibility" xmlns:p15="http://schemas.microsoft.com/office/powerpoint/2012/main">
+    <mc:Fallback xmlns:p15="http://schemas.microsoft.com/office/powerpoint/2012/main" xmlns:com="http://schemas.openxmlformats.org/drawingml/2006/compatibility" xmlns:pvml="urn:schemas-microsoft-com:office:powerpoint" xmlns:v="urn:schemas-microsoft-com:vml" xmlns:o="urn:schemas-microsoft-com:office:office" xmlns:dgm="http://schemas.openxmlformats.org/drawingml/2006/diagram" xmlns:c="http://schemas.openxmlformats.org/drawingml/2006/chart" xmlns:mv="urn:schemas-microsoft-com:mac:vml" xmlns="">
       <p:transition spd="slow">
         <p:fade/>
       </p:transition>
@@ -7991,7 +7991,7 @@
         <p:fade/>
       </p:transition>
     </mc:Choice>
-    <mc:Fallback xmlns="" xmlns:mv="urn:schemas-microsoft-com:mac:vml" xmlns:c="http://schemas.openxmlformats.org/drawingml/2006/chart" xmlns:dgm="http://schemas.openxmlformats.org/drawingml/2006/diagram" xmlns:o="urn:schemas-microsoft-com:office:office" xmlns:v="urn:schemas-microsoft-com:vml" xmlns:pvml="urn:schemas-microsoft-com:office:powerpoint" xmlns:com="http://schemas.openxmlformats.org/drawingml/2006/compatibility" xmlns:p15="http://schemas.microsoft.com/office/powerpoint/2012/main">
+    <mc:Fallback xmlns:p15="http://schemas.microsoft.com/office/powerpoint/2012/main" xmlns:com="http://schemas.openxmlformats.org/drawingml/2006/compatibility" xmlns:pvml="urn:schemas-microsoft-com:office:powerpoint" xmlns:v="urn:schemas-microsoft-com:vml" xmlns:o="urn:schemas-microsoft-com:office:office" xmlns:dgm="http://schemas.openxmlformats.org/drawingml/2006/diagram" xmlns:c="http://schemas.openxmlformats.org/drawingml/2006/chart" xmlns:mv="urn:schemas-microsoft-com:mac:vml" xmlns="">
       <p:transition spd="slow">
         <p:fade/>
       </p:transition>
@@ -9251,7 +9251,7 @@
         <p:fade/>
       </p:transition>
     </mc:Choice>
-    <mc:Fallback xmlns="" xmlns:mv="urn:schemas-microsoft-com:mac:vml" xmlns:c="http://schemas.openxmlformats.org/drawingml/2006/chart" xmlns:dgm="http://schemas.openxmlformats.org/drawingml/2006/diagram" xmlns:o="urn:schemas-microsoft-com:office:office" xmlns:v="urn:schemas-microsoft-com:vml" xmlns:pvml="urn:schemas-microsoft-com:office:powerpoint" xmlns:com="http://schemas.openxmlformats.org/drawingml/2006/compatibility" xmlns:p15="http://schemas.microsoft.com/office/powerpoint/2012/main">
+    <mc:Fallback xmlns:p15="http://schemas.microsoft.com/office/powerpoint/2012/main" xmlns:com="http://schemas.openxmlformats.org/drawingml/2006/compatibility" xmlns:pvml="urn:schemas-microsoft-com:office:powerpoint" xmlns:v="urn:schemas-microsoft-com:vml" xmlns:o="urn:schemas-microsoft-com:office:office" xmlns:dgm="http://schemas.openxmlformats.org/drawingml/2006/diagram" xmlns:c="http://schemas.openxmlformats.org/drawingml/2006/chart" xmlns:mv="urn:schemas-microsoft-com:mac:vml" xmlns="">
       <p:transition spd="slow">
         <p:fade/>
       </p:transition>
@@ -10499,7 +10499,7 @@
         <p:fade/>
       </p:transition>
     </mc:Choice>
-    <mc:Fallback xmlns="" xmlns:mv="urn:schemas-microsoft-com:mac:vml" xmlns:c="http://schemas.openxmlformats.org/drawingml/2006/chart" xmlns:dgm="http://schemas.openxmlformats.org/drawingml/2006/diagram" xmlns:o="urn:schemas-microsoft-com:office:office" xmlns:v="urn:schemas-microsoft-com:vml" xmlns:pvml="urn:schemas-microsoft-com:office:powerpoint" xmlns:com="http://schemas.openxmlformats.org/drawingml/2006/compatibility" xmlns:p15="http://schemas.microsoft.com/office/powerpoint/2012/main">
+    <mc:Fallback xmlns:p15="http://schemas.microsoft.com/office/powerpoint/2012/main" xmlns:com="http://schemas.openxmlformats.org/drawingml/2006/compatibility" xmlns:pvml="urn:schemas-microsoft-com:office:powerpoint" xmlns:v="urn:schemas-microsoft-com:vml" xmlns:o="urn:schemas-microsoft-com:office:office" xmlns:dgm="http://schemas.openxmlformats.org/drawingml/2006/diagram" xmlns:c="http://schemas.openxmlformats.org/drawingml/2006/chart" xmlns:mv="urn:schemas-microsoft-com:mac:vml" xmlns="">
       <p:transition spd="slow">
         <p:fade/>
       </p:transition>
@@ -12225,7 +12225,7 @@
         <p:fade/>
       </p:transition>
     </mc:Choice>
-    <mc:Fallback xmlns="" xmlns:mv="urn:schemas-microsoft-com:mac:vml" xmlns:c="http://schemas.openxmlformats.org/drawingml/2006/chart" xmlns:dgm="http://schemas.openxmlformats.org/drawingml/2006/diagram" xmlns:o="urn:schemas-microsoft-com:office:office" xmlns:v="urn:schemas-microsoft-com:vml" xmlns:pvml="urn:schemas-microsoft-com:office:powerpoint" xmlns:com="http://schemas.openxmlformats.org/drawingml/2006/compatibility" xmlns:p15="http://schemas.microsoft.com/office/powerpoint/2012/main">
+    <mc:Fallback xmlns:p15="http://schemas.microsoft.com/office/powerpoint/2012/main" xmlns:com="http://schemas.openxmlformats.org/drawingml/2006/compatibility" xmlns:pvml="urn:schemas-microsoft-com:office:powerpoint" xmlns:v="urn:schemas-microsoft-com:vml" xmlns:o="urn:schemas-microsoft-com:office:office" xmlns:dgm="http://schemas.openxmlformats.org/drawingml/2006/diagram" xmlns:c="http://schemas.openxmlformats.org/drawingml/2006/chart" xmlns:mv="urn:schemas-microsoft-com:mac:vml" xmlns="">
       <p:transition spd="slow">
         <p:fade/>
       </p:transition>
@@ -12995,7 +12995,7 @@
         <p:fade/>
       </p:transition>
     </mc:Choice>
-    <mc:Fallback xmlns="" xmlns:mv="urn:schemas-microsoft-com:mac:vml" xmlns:c="http://schemas.openxmlformats.org/drawingml/2006/chart" xmlns:dgm="http://schemas.openxmlformats.org/drawingml/2006/diagram" xmlns:o="urn:schemas-microsoft-com:office:office" xmlns:v="urn:schemas-microsoft-com:vml" xmlns:pvml="urn:schemas-microsoft-com:office:powerpoint" xmlns:com="http://schemas.openxmlformats.org/drawingml/2006/compatibility" xmlns:p15="http://schemas.microsoft.com/office/powerpoint/2012/main">
+    <mc:Fallback xmlns:p15="http://schemas.microsoft.com/office/powerpoint/2012/main" xmlns:com="http://schemas.openxmlformats.org/drawingml/2006/compatibility" xmlns:pvml="urn:schemas-microsoft-com:office:powerpoint" xmlns:v="urn:schemas-microsoft-com:vml" xmlns:o="urn:schemas-microsoft-com:office:office" xmlns:dgm="http://schemas.openxmlformats.org/drawingml/2006/diagram" xmlns:c="http://schemas.openxmlformats.org/drawingml/2006/chart" xmlns:mv="urn:schemas-microsoft-com:mac:vml" xmlns="">
       <p:transition spd="slow">
         <p:fade/>
       </p:transition>
@@ -13622,7 +13622,7 @@
         <p:fade/>
       </p:transition>
     </mc:Choice>
-    <mc:Fallback xmlns="" xmlns:mv="urn:schemas-microsoft-com:mac:vml" xmlns:c="http://schemas.openxmlformats.org/drawingml/2006/chart" xmlns:dgm="http://schemas.openxmlformats.org/drawingml/2006/diagram" xmlns:o="urn:schemas-microsoft-com:office:office" xmlns:v="urn:schemas-microsoft-com:vml" xmlns:pvml="urn:schemas-microsoft-com:office:powerpoint" xmlns:com="http://schemas.openxmlformats.org/drawingml/2006/compatibility" xmlns:p15="http://schemas.microsoft.com/office/powerpoint/2012/main">
+    <mc:Fallback xmlns:p15="http://schemas.microsoft.com/office/powerpoint/2012/main" xmlns:com="http://schemas.openxmlformats.org/drawingml/2006/compatibility" xmlns:pvml="urn:schemas-microsoft-com:office:powerpoint" xmlns:v="urn:schemas-microsoft-com:vml" xmlns:o="urn:schemas-microsoft-com:office:office" xmlns:dgm="http://schemas.openxmlformats.org/drawingml/2006/diagram" xmlns:c="http://schemas.openxmlformats.org/drawingml/2006/chart" xmlns:mv="urn:schemas-microsoft-com:mac:vml" xmlns="">
       <p:transition spd="slow">
         <p:fade/>
       </p:transition>
@@ -14977,7 +14977,7 @@
         <p:fade/>
       </p:transition>
     </mc:Choice>
-    <mc:Fallback xmlns="" xmlns:mv="urn:schemas-microsoft-com:mac:vml" xmlns:c="http://schemas.openxmlformats.org/drawingml/2006/chart" xmlns:dgm="http://schemas.openxmlformats.org/drawingml/2006/diagram" xmlns:o="urn:schemas-microsoft-com:office:office" xmlns:v="urn:schemas-microsoft-com:vml" xmlns:pvml="urn:schemas-microsoft-com:office:powerpoint" xmlns:com="http://schemas.openxmlformats.org/drawingml/2006/compatibility" xmlns:p15="http://schemas.microsoft.com/office/powerpoint/2012/main">
+    <mc:Fallback xmlns:p15="http://schemas.microsoft.com/office/powerpoint/2012/main" xmlns:com="http://schemas.openxmlformats.org/drawingml/2006/compatibility" xmlns:pvml="urn:schemas-microsoft-com:office:powerpoint" xmlns:v="urn:schemas-microsoft-com:vml" xmlns:o="urn:schemas-microsoft-com:office:office" xmlns:dgm="http://schemas.openxmlformats.org/drawingml/2006/diagram" xmlns:c="http://schemas.openxmlformats.org/drawingml/2006/chart" xmlns:mv="urn:schemas-microsoft-com:mac:vml" xmlns="">
       <p:transition spd="slow">
         <p:fade/>
       </p:transition>
@@ -16380,7 +16380,7 @@
         <p:fade/>
       </p:transition>
     </mc:Choice>
-    <mc:Fallback xmlns="" xmlns:mv="urn:schemas-microsoft-com:mac:vml" xmlns:c="http://schemas.openxmlformats.org/drawingml/2006/chart" xmlns:dgm="http://schemas.openxmlformats.org/drawingml/2006/diagram" xmlns:o="urn:schemas-microsoft-com:office:office" xmlns:v="urn:schemas-microsoft-com:vml" xmlns:pvml="urn:schemas-microsoft-com:office:powerpoint" xmlns:com="http://schemas.openxmlformats.org/drawingml/2006/compatibility" xmlns:p15="http://schemas.microsoft.com/office/powerpoint/2012/main">
+    <mc:Fallback xmlns:p15="http://schemas.microsoft.com/office/powerpoint/2012/main" xmlns:com="http://schemas.openxmlformats.org/drawingml/2006/compatibility" xmlns:pvml="urn:schemas-microsoft-com:office:powerpoint" xmlns:v="urn:schemas-microsoft-com:vml" xmlns:o="urn:schemas-microsoft-com:office:office" xmlns:dgm="http://schemas.openxmlformats.org/drawingml/2006/diagram" xmlns:c="http://schemas.openxmlformats.org/drawingml/2006/chart" xmlns:mv="urn:schemas-microsoft-com:mac:vml" xmlns="">
       <p:transition spd="slow">
         <p:fade/>
       </p:transition>
@@ -17518,7 +17518,7 @@
         <p:fade/>
       </p:transition>
     </mc:Choice>
-    <mc:Fallback xmlns="" xmlns:mv="urn:schemas-microsoft-com:mac:vml" xmlns:c="http://schemas.openxmlformats.org/drawingml/2006/chart" xmlns:dgm="http://schemas.openxmlformats.org/drawingml/2006/diagram" xmlns:o="urn:schemas-microsoft-com:office:office" xmlns:v="urn:schemas-microsoft-com:vml" xmlns:pvml="urn:schemas-microsoft-com:office:powerpoint" xmlns:com="http://schemas.openxmlformats.org/drawingml/2006/compatibility" xmlns:p15="http://schemas.microsoft.com/office/powerpoint/2012/main">
+    <mc:Fallback xmlns:p15="http://schemas.microsoft.com/office/powerpoint/2012/main" xmlns:com="http://schemas.openxmlformats.org/drawingml/2006/compatibility" xmlns:pvml="urn:schemas-microsoft-com:office:powerpoint" xmlns:v="urn:schemas-microsoft-com:vml" xmlns:o="urn:schemas-microsoft-com:office:office" xmlns:dgm="http://schemas.openxmlformats.org/drawingml/2006/diagram" xmlns:c="http://schemas.openxmlformats.org/drawingml/2006/chart" xmlns:mv="urn:schemas-microsoft-com:mac:vml" xmlns="">
       <p:transition spd="slow">
         <p:fade/>
       </p:transition>
@@ -18592,7 +18592,7 @@
         <p:fade/>
       </p:transition>
     </mc:Choice>
-    <mc:Fallback xmlns="" xmlns:mv="urn:schemas-microsoft-com:mac:vml" xmlns:c="http://schemas.openxmlformats.org/drawingml/2006/chart" xmlns:dgm="http://schemas.openxmlformats.org/drawingml/2006/diagram" xmlns:o="urn:schemas-microsoft-com:office:office" xmlns:v="urn:schemas-microsoft-com:vml" xmlns:pvml="urn:schemas-microsoft-com:office:powerpoint" xmlns:com="http://schemas.openxmlformats.org/drawingml/2006/compatibility" xmlns:p15="http://schemas.microsoft.com/office/powerpoint/2012/main">
+    <mc:Fallback xmlns:p15="http://schemas.microsoft.com/office/powerpoint/2012/main" xmlns:com="http://schemas.openxmlformats.org/drawingml/2006/compatibility" xmlns:pvml="urn:schemas-microsoft-com:office:powerpoint" xmlns:v="urn:schemas-microsoft-com:vml" xmlns:o="urn:schemas-microsoft-com:office:office" xmlns:dgm="http://schemas.openxmlformats.org/drawingml/2006/diagram" xmlns:c="http://schemas.openxmlformats.org/drawingml/2006/chart" xmlns:mv="urn:schemas-microsoft-com:mac:vml" xmlns="">
       <p:transition spd="slow">
         <p:fade/>
       </p:transition>
@@ -18873,33 +18873,6 @@
       </p:sp>
       <p:pic>
         <p:nvPicPr>
-          <p:cNvPr id="191" name="Republican"/>
-          <p:cNvPicPr preferRelativeResize="0"/>
-          <p:nvPr/>
-        </p:nvPicPr>
-        <p:blipFill rotWithShape="1">
-          <a:blip r:embed="rId4">
-            <a:alphaModFix/>
-          </a:blip>
-          <a:srcRect/>
-          <a:stretch/>
-        </p:blipFill>
-        <p:spPr>
-          <a:xfrm>
-            <a:off x="9359223" y="1417638"/>
-            <a:ext cx="2240678" cy="4603810"/>
-          </a:xfrm>
-          <a:prstGeom prst="rect">
-            <a:avLst/>
-          </a:prstGeom>
-          <a:noFill/>
-          <a:ln>
-            <a:noFill/>
-          </a:ln>
-        </p:spPr>
-      </p:pic>
-      <p:pic>
-        <p:nvPicPr>
           <p:cNvPr id="2" name="Picture 1"/>
           <p:cNvPicPr>
             <a:picLocks noChangeAspect="1"/>
@@ -18907,7 +18880,7 @@
           <p:nvPr/>
         </p:nvPicPr>
         <p:blipFill>
-          <a:blip r:embed="rId5">
+          <a:blip r:embed="rId4">
             <a:extLst>
               <a:ext uri="{28A0092B-C50C-407E-A947-70E740481C1C}">
                 <a14:useLocalDpi xmlns:a14="http://schemas.microsoft.com/office/drawing/2010/main" val="0"/>
@@ -19022,6 +18995,36 @@
       </p:sp>
       <p:pic>
         <p:nvPicPr>
+          <p:cNvPr id="5" name="Republican"/>
+          <p:cNvPicPr>
+            <a:picLocks noChangeAspect="1"/>
+          </p:cNvPicPr>
+          <p:nvPr/>
+        </p:nvPicPr>
+        <p:blipFill>
+          <a:blip r:embed="rId5">
+            <a:extLst>
+              <a:ext uri="{28A0092B-C50C-407E-A947-70E740481C1C}">
+                <a14:useLocalDpi xmlns:a14="http://schemas.microsoft.com/office/drawing/2010/main" val="0"/>
+              </a:ext>
+            </a:extLst>
+          </a:blip>
+          <a:stretch>
+            <a:fillRect/>
+          </a:stretch>
+        </p:blipFill>
+        <p:spPr>
+          <a:xfrm>
+            <a:off x="9319819" y="1385828"/>
+            <a:ext cx="2589643" cy="4603810"/>
+          </a:xfrm>
+          <a:prstGeom prst="rect">
+            <a:avLst/>
+          </a:prstGeom>
+        </p:spPr>
+      </p:pic>
+      <p:pic>
+        <p:nvPicPr>
           <p:cNvPr id="4" name="Democrat"/>
           <p:cNvPicPr>
             <a:picLocks noChangeAspect="1"/>
@@ -19061,7 +19064,7 @@
         <p:fade/>
       </p:transition>
     </mc:Choice>
-    <mc:Fallback xmlns="" xmlns:mv="urn:schemas-microsoft-com:mac:vml" xmlns:c="http://schemas.openxmlformats.org/drawingml/2006/chart" xmlns:dgm="http://schemas.openxmlformats.org/drawingml/2006/diagram" xmlns:o="urn:schemas-microsoft-com:office:office" xmlns:v="urn:schemas-microsoft-com:vml" xmlns:pvml="urn:schemas-microsoft-com:office:powerpoint" xmlns:com="http://schemas.openxmlformats.org/drawingml/2006/compatibility" xmlns:p15="http://schemas.microsoft.com/office/powerpoint/2012/main">
+    <mc:Fallback xmlns:p15="http://schemas.microsoft.com/office/powerpoint/2012/main" xmlns:com="http://schemas.openxmlformats.org/drawingml/2006/compatibility" xmlns:pvml="urn:schemas-microsoft-com:office:powerpoint" xmlns:v="urn:schemas-microsoft-com:vml" xmlns:o="urn:schemas-microsoft-com:office:office" xmlns:dgm="http://schemas.openxmlformats.org/drawingml/2006/diagram" xmlns:c="http://schemas.openxmlformats.org/drawingml/2006/chart" xmlns:mv="urn:schemas-microsoft-com:mac:vml" xmlns="">
       <p:transition spd="slow">
         <p:fade/>
       </p:transition>
@@ -19484,7 +19487,7 @@
                                           </p:stCondLst>
                                         </p:cTn>
                                         <p:tgtEl>
-                                          <p:spTgt spid="191"/>
+                                          <p:spTgt spid="5"/>
                                         </p:tgtEl>
                                         <p:attrNameLst>
                                           <p:attrName>style.visibility</p:attrName>
@@ -19498,7 +19501,7 @@
                                       <p:cBhvr>
                                         <p:cTn id="36" dur="500"/>
                                         <p:tgtEl>
-                                          <p:spTgt spid="191"/>
+                                          <p:spTgt spid="5"/>
                                         </p:tgtEl>
                                       </p:cBhvr>
                                     </p:animEffect>
@@ -20503,7 +20506,7 @@
         <p:fade/>
       </p:transition>
     </mc:Choice>
-    <mc:Fallback xmlns="" xmlns:mv="urn:schemas-microsoft-com:mac:vml" xmlns:c="http://schemas.openxmlformats.org/drawingml/2006/chart" xmlns:dgm="http://schemas.openxmlformats.org/drawingml/2006/diagram" xmlns:o="urn:schemas-microsoft-com:office:office" xmlns:v="urn:schemas-microsoft-com:vml" xmlns:pvml="urn:schemas-microsoft-com:office:powerpoint" xmlns:com="http://schemas.openxmlformats.org/drawingml/2006/compatibility" xmlns:p15="http://schemas.microsoft.com/office/powerpoint/2012/main">
+    <mc:Fallback xmlns:p15="http://schemas.microsoft.com/office/powerpoint/2012/main" xmlns:com="http://schemas.openxmlformats.org/drawingml/2006/compatibility" xmlns:pvml="urn:schemas-microsoft-com:office:powerpoint" xmlns:v="urn:schemas-microsoft-com:vml" xmlns:o="urn:schemas-microsoft-com:office:office" xmlns:dgm="http://schemas.openxmlformats.org/drawingml/2006/diagram" xmlns:c="http://schemas.openxmlformats.org/drawingml/2006/chart" xmlns:mv="urn:schemas-microsoft-com:mac:vml" xmlns="">
       <p:transition spd="slow">
         <p:fade/>
       </p:transition>
@@ -20645,7 +20648,7 @@
         <p:fade/>
       </p:transition>
     </mc:Choice>
-    <mc:Fallback xmlns="" xmlns:mv="urn:schemas-microsoft-com:mac:vml" xmlns:c="http://schemas.openxmlformats.org/drawingml/2006/chart" xmlns:dgm="http://schemas.openxmlformats.org/drawingml/2006/diagram" xmlns:o="urn:schemas-microsoft-com:office:office" xmlns:v="urn:schemas-microsoft-com:vml" xmlns:pvml="urn:schemas-microsoft-com:office:powerpoint" xmlns:com="http://schemas.openxmlformats.org/drawingml/2006/compatibility" xmlns:p15="http://schemas.microsoft.com/office/powerpoint/2012/main">
+    <mc:Fallback xmlns:p15="http://schemas.microsoft.com/office/powerpoint/2012/main" xmlns:com="http://schemas.openxmlformats.org/drawingml/2006/compatibility" xmlns:pvml="urn:schemas-microsoft-com:office:powerpoint" xmlns:v="urn:schemas-microsoft-com:vml" xmlns:o="urn:schemas-microsoft-com:office:office" xmlns:dgm="http://schemas.openxmlformats.org/drawingml/2006/diagram" xmlns:c="http://schemas.openxmlformats.org/drawingml/2006/chart" xmlns:mv="urn:schemas-microsoft-com:mac:vml" xmlns="">
       <p:transition spd="slow">
         <p:fade/>
       </p:transition>
@@ -20787,7 +20790,7 @@
         <p:fade/>
       </p:transition>
     </mc:Choice>
-    <mc:Fallback xmlns="" xmlns:mv="urn:schemas-microsoft-com:mac:vml" xmlns:c="http://schemas.openxmlformats.org/drawingml/2006/chart" xmlns:dgm="http://schemas.openxmlformats.org/drawingml/2006/diagram" xmlns:o="urn:schemas-microsoft-com:office:office" xmlns:v="urn:schemas-microsoft-com:vml" xmlns:pvml="urn:schemas-microsoft-com:office:powerpoint" xmlns:com="http://schemas.openxmlformats.org/drawingml/2006/compatibility" xmlns:p15="http://schemas.microsoft.com/office/powerpoint/2012/main">
+    <mc:Fallback xmlns:p15="http://schemas.microsoft.com/office/powerpoint/2012/main" xmlns:com="http://schemas.openxmlformats.org/drawingml/2006/compatibility" xmlns:pvml="urn:schemas-microsoft-com:office:powerpoint" xmlns:v="urn:schemas-microsoft-com:vml" xmlns:o="urn:schemas-microsoft-com:office:office" xmlns:dgm="http://schemas.openxmlformats.org/drawingml/2006/diagram" xmlns:c="http://schemas.openxmlformats.org/drawingml/2006/chart" xmlns:mv="urn:schemas-microsoft-com:mac:vml" xmlns="">
       <p:transition spd="slow">
         <p:fade/>
       </p:transition>
@@ -20981,7 +20984,7 @@
         <p:fade/>
       </p:transition>
     </mc:Choice>
-    <mc:Fallback xmlns="" xmlns:mv="urn:schemas-microsoft-com:mac:vml" xmlns:c="http://schemas.openxmlformats.org/drawingml/2006/chart" xmlns:dgm="http://schemas.openxmlformats.org/drawingml/2006/diagram" xmlns:o="urn:schemas-microsoft-com:office:office" xmlns:v="urn:schemas-microsoft-com:vml" xmlns:pvml="urn:schemas-microsoft-com:office:powerpoint" xmlns:com="http://schemas.openxmlformats.org/drawingml/2006/compatibility" xmlns:p15="http://schemas.microsoft.com/office/powerpoint/2012/main">
+    <mc:Fallback xmlns:p15="http://schemas.microsoft.com/office/powerpoint/2012/main" xmlns:com="http://schemas.openxmlformats.org/drawingml/2006/compatibility" xmlns:pvml="urn:schemas-microsoft-com:office:powerpoint" xmlns:v="urn:schemas-microsoft-com:vml" xmlns:o="urn:schemas-microsoft-com:office:office" xmlns:dgm="http://schemas.openxmlformats.org/drawingml/2006/diagram" xmlns:c="http://schemas.openxmlformats.org/drawingml/2006/chart" xmlns:mv="urn:schemas-microsoft-com:mac:vml" xmlns="">
       <p:transition spd="slow">
         <p:fade/>
       </p:transition>
@@ -21304,7 +21307,7 @@
         <p:fade/>
       </p:transition>
     </mc:Choice>
-    <mc:Fallback xmlns="" xmlns:mv="urn:schemas-microsoft-com:mac:vml" xmlns:c="http://schemas.openxmlformats.org/drawingml/2006/chart" xmlns:dgm="http://schemas.openxmlformats.org/drawingml/2006/diagram" xmlns:o="urn:schemas-microsoft-com:office:office" xmlns:v="urn:schemas-microsoft-com:vml" xmlns:pvml="urn:schemas-microsoft-com:office:powerpoint" xmlns:com="http://schemas.openxmlformats.org/drawingml/2006/compatibility" xmlns:p15="http://schemas.microsoft.com/office/powerpoint/2012/main">
+    <mc:Fallback xmlns:p15="http://schemas.microsoft.com/office/powerpoint/2012/main" xmlns:com="http://schemas.openxmlformats.org/drawingml/2006/compatibility" xmlns:pvml="urn:schemas-microsoft-com:office:powerpoint" xmlns:v="urn:schemas-microsoft-com:vml" xmlns:o="urn:schemas-microsoft-com:office:office" xmlns:dgm="http://schemas.openxmlformats.org/drawingml/2006/diagram" xmlns:c="http://schemas.openxmlformats.org/drawingml/2006/chart" xmlns:mv="urn:schemas-microsoft-com:mac:vml" xmlns="">
       <p:transition spd="slow">
         <p:fade/>
       </p:transition>
@@ -21652,7 +21655,7 @@
         <p:fade/>
       </p:transition>
     </mc:Choice>
-    <mc:Fallback xmlns="" xmlns:mv="urn:schemas-microsoft-com:mac:vml" xmlns:c="http://schemas.openxmlformats.org/drawingml/2006/chart" xmlns:dgm="http://schemas.openxmlformats.org/drawingml/2006/diagram" xmlns:o="urn:schemas-microsoft-com:office:office" xmlns:v="urn:schemas-microsoft-com:vml" xmlns:pvml="urn:schemas-microsoft-com:office:powerpoint" xmlns:com="http://schemas.openxmlformats.org/drawingml/2006/compatibility" xmlns:p15="http://schemas.microsoft.com/office/powerpoint/2012/main">
+    <mc:Fallback xmlns:p15="http://schemas.microsoft.com/office/powerpoint/2012/main" xmlns:com="http://schemas.openxmlformats.org/drawingml/2006/compatibility" xmlns:pvml="urn:schemas-microsoft-com:office:powerpoint" xmlns:v="urn:schemas-microsoft-com:vml" xmlns:o="urn:schemas-microsoft-com:office:office" xmlns:dgm="http://schemas.openxmlformats.org/drawingml/2006/diagram" xmlns:c="http://schemas.openxmlformats.org/drawingml/2006/chart" xmlns:mv="urn:schemas-microsoft-com:mac:vml" xmlns="">
       <p:transition spd="slow">
         <p:fade/>
       </p:transition>
@@ -21975,7 +21978,7 @@
         <p:fade/>
       </p:transition>
     </mc:Choice>
-    <mc:Fallback xmlns="" xmlns:mv="urn:schemas-microsoft-com:mac:vml" xmlns:c="http://schemas.openxmlformats.org/drawingml/2006/chart" xmlns:dgm="http://schemas.openxmlformats.org/drawingml/2006/diagram" xmlns:o="urn:schemas-microsoft-com:office:office" xmlns:v="urn:schemas-microsoft-com:vml" xmlns:pvml="urn:schemas-microsoft-com:office:powerpoint" xmlns:com="http://schemas.openxmlformats.org/drawingml/2006/compatibility" xmlns:p15="http://schemas.microsoft.com/office/powerpoint/2012/main">
+    <mc:Fallback xmlns:p15="http://schemas.microsoft.com/office/powerpoint/2012/main" xmlns:com="http://schemas.openxmlformats.org/drawingml/2006/compatibility" xmlns:pvml="urn:schemas-microsoft-com:office:powerpoint" xmlns:v="urn:schemas-microsoft-com:vml" xmlns:o="urn:schemas-microsoft-com:office:office" xmlns:dgm="http://schemas.openxmlformats.org/drawingml/2006/diagram" xmlns:c="http://schemas.openxmlformats.org/drawingml/2006/chart" xmlns:mv="urn:schemas-microsoft-com:mac:vml" xmlns="">
       <p:transition spd="slow">
         <p:fade/>
       </p:transition>
@@ -22277,7 +22280,7 @@
         <p:fade/>
       </p:transition>
     </mc:Choice>
-    <mc:Fallback xmlns="" xmlns:mv="urn:schemas-microsoft-com:mac:vml" xmlns:c="http://schemas.openxmlformats.org/drawingml/2006/chart" xmlns:dgm="http://schemas.openxmlformats.org/drawingml/2006/diagram" xmlns:o="urn:schemas-microsoft-com:office:office" xmlns:v="urn:schemas-microsoft-com:vml" xmlns:pvml="urn:schemas-microsoft-com:office:powerpoint" xmlns:com="http://schemas.openxmlformats.org/drawingml/2006/compatibility" xmlns:p15="http://schemas.microsoft.com/office/powerpoint/2012/main">
+    <mc:Fallback xmlns:p15="http://schemas.microsoft.com/office/powerpoint/2012/main" xmlns:com="http://schemas.openxmlformats.org/drawingml/2006/compatibility" xmlns:pvml="urn:schemas-microsoft-com:office:powerpoint" xmlns:v="urn:schemas-microsoft-com:vml" xmlns:o="urn:schemas-microsoft-com:office:office" xmlns:dgm="http://schemas.openxmlformats.org/drawingml/2006/diagram" xmlns:c="http://schemas.openxmlformats.org/drawingml/2006/chart" xmlns:mv="urn:schemas-microsoft-com:mac:vml" xmlns="">
       <p:transition spd="slow">
         <p:fade/>
       </p:transition>
@@ -22588,7 +22591,7 @@
         <p:fade/>
       </p:transition>
     </mc:Choice>
-    <mc:Fallback xmlns="" xmlns:mv="urn:schemas-microsoft-com:mac:vml" xmlns:c="http://schemas.openxmlformats.org/drawingml/2006/chart" xmlns:dgm="http://schemas.openxmlformats.org/drawingml/2006/diagram" xmlns:o="urn:schemas-microsoft-com:office:office" xmlns:v="urn:schemas-microsoft-com:vml" xmlns:pvml="urn:schemas-microsoft-com:office:powerpoint" xmlns:com="http://schemas.openxmlformats.org/drawingml/2006/compatibility" xmlns:p15="http://schemas.microsoft.com/office/powerpoint/2012/main">
+    <mc:Fallback xmlns:p15="http://schemas.microsoft.com/office/powerpoint/2012/main" xmlns:com="http://schemas.openxmlformats.org/drawingml/2006/compatibility" xmlns:pvml="urn:schemas-microsoft-com:office:powerpoint" xmlns:v="urn:schemas-microsoft-com:vml" xmlns:o="urn:schemas-microsoft-com:office:office" xmlns:dgm="http://schemas.openxmlformats.org/drawingml/2006/diagram" xmlns:c="http://schemas.openxmlformats.org/drawingml/2006/chart" xmlns:mv="urn:schemas-microsoft-com:mac:vml" xmlns="">
       <p:transition spd="slow">
         <p:fade/>
       </p:transition>
@@ -22911,7 +22914,7 @@
         <p:fade/>
       </p:transition>
     </mc:Choice>
-    <mc:Fallback xmlns="" xmlns:mv="urn:schemas-microsoft-com:mac:vml" xmlns:c="http://schemas.openxmlformats.org/drawingml/2006/chart" xmlns:dgm="http://schemas.openxmlformats.org/drawingml/2006/diagram" xmlns:o="urn:schemas-microsoft-com:office:office" xmlns:v="urn:schemas-microsoft-com:vml" xmlns:pvml="urn:schemas-microsoft-com:office:powerpoint" xmlns:com="http://schemas.openxmlformats.org/drawingml/2006/compatibility" xmlns:p15="http://schemas.microsoft.com/office/powerpoint/2012/main">
+    <mc:Fallback xmlns:p15="http://schemas.microsoft.com/office/powerpoint/2012/main" xmlns:com="http://schemas.openxmlformats.org/drawingml/2006/compatibility" xmlns:pvml="urn:schemas-microsoft-com:office:powerpoint" xmlns:v="urn:schemas-microsoft-com:vml" xmlns:o="urn:schemas-microsoft-com:office:office" xmlns:dgm="http://schemas.openxmlformats.org/drawingml/2006/diagram" xmlns:c="http://schemas.openxmlformats.org/drawingml/2006/chart" xmlns:mv="urn:schemas-microsoft-com:mac:vml" xmlns="">
       <p:transition spd="slow">
         <p:fade/>
       </p:transition>
@@ -23276,7 +23279,7 @@
         <p:fade/>
       </p:transition>
     </mc:Choice>
-    <mc:Fallback xmlns="" xmlns:mv="urn:schemas-microsoft-com:mac:vml" xmlns:c="http://schemas.openxmlformats.org/drawingml/2006/chart" xmlns:dgm="http://schemas.openxmlformats.org/drawingml/2006/diagram" xmlns:o="urn:schemas-microsoft-com:office:office" xmlns:v="urn:schemas-microsoft-com:vml" xmlns:pvml="urn:schemas-microsoft-com:office:powerpoint" xmlns:com="http://schemas.openxmlformats.org/drawingml/2006/compatibility" xmlns:p15="http://schemas.microsoft.com/office/powerpoint/2012/main">
+    <mc:Fallback xmlns:p15="http://schemas.microsoft.com/office/powerpoint/2012/main" xmlns:com="http://schemas.openxmlformats.org/drawingml/2006/compatibility" xmlns:pvml="urn:schemas-microsoft-com:office:powerpoint" xmlns:v="urn:schemas-microsoft-com:vml" xmlns:o="urn:schemas-microsoft-com:office:office" xmlns:dgm="http://schemas.openxmlformats.org/drawingml/2006/diagram" xmlns:c="http://schemas.openxmlformats.org/drawingml/2006/chart" xmlns:mv="urn:schemas-microsoft-com:mac:vml" xmlns="">
       <p:transition spd="slow">
         <p:fade/>
       </p:transition>
@@ -23599,7 +23602,7 @@
         <p:fade/>
       </p:transition>
     </mc:Choice>
-    <mc:Fallback xmlns="" xmlns:mv="urn:schemas-microsoft-com:mac:vml" xmlns:c="http://schemas.openxmlformats.org/drawingml/2006/chart" xmlns:dgm="http://schemas.openxmlformats.org/drawingml/2006/diagram" xmlns:o="urn:schemas-microsoft-com:office:office" xmlns:v="urn:schemas-microsoft-com:vml" xmlns:pvml="urn:schemas-microsoft-com:office:powerpoint" xmlns:com="http://schemas.openxmlformats.org/drawingml/2006/compatibility" xmlns:p15="http://schemas.microsoft.com/office/powerpoint/2012/main">
+    <mc:Fallback xmlns:p15="http://schemas.microsoft.com/office/powerpoint/2012/main" xmlns:com="http://schemas.openxmlformats.org/drawingml/2006/compatibility" xmlns:pvml="urn:schemas-microsoft-com:office:powerpoint" xmlns:v="urn:schemas-microsoft-com:vml" xmlns:o="urn:schemas-microsoft-com:office:office" xmlns:dgm="http://schemas.openxmlformats.org/drawingml/2006/diagram" xmlns:c="http://schemas.openxmlformats.org/drawingml/2006/chart" xmlns:mv="urn:schemas-microsoft-com:mac:vml" xmlns="">
       <p:transition spd="slow">
         <p:fade/>
       </p:transition>
@@ -23897,7 +23900,7 @@
         <p:fade/>
       </p:transition>
     </mc:Choice>
-    <mc:Fallback xmlns="" xmlns:mv="urn:schemas-microsoft-com:mac:vml" xmlns:c="http://schemas.openxmlformats.org/drawingml/2006/chart" xmlns:dgm="http://schemas.openxmlformats.org/drawingml/2006/diagram" xmlns:o="urn:schemas-microsoft-com:office:office" xmlns:v="urn:schemas-microsoft-com:vml" xmlns:pvml="urn:schemas-microsoft-com:office:powerpoint" xmlns:com="http://schemas.openxmlformats.org/drawingml/2006/compatibility" xmlns:p15="http://schemas.microsoft.com/office/powerpoint/2012/main">
+    <mc:Fallback xmlns:p15="http://schemas.microsoft.com/office/powerpoint/2012/main" xmlns:com="http://schemas.openxmlformats.org/drawingml/2006/compatibility" xmlns:pvml="urn:schemas-microsoft-com:office:powerpoint" xmlns:v="urn:schemas-microsoft-com:vml" xmlns:o="urn:schemas-microsoft-com:office:office" xmlns:dgm="http://schemas.openxmlformats.org/drawingml/2006/diagram" xmlns:c="http://schemas.openxmlformats.org/drawingml/2006/chart" xmlns:mv="urn:schemas-microsoft-com:mac:vml" xmlns="">
       <p:transition spd="slow">
         <p:fade/>
       </p:transition>
@@ -24237,7 +24240,7 @@
         <p:fade/>
       </p:transition>
     </mc:Choice>
-    <mc:Fallback xmlns="" xmlns:mv="urn:schemas-microsoft-com:mac:vml" xmlns:c="http://schemas.openxmlformats.org/drawingml/2006/chart" xmlns:dgm="http://schemas.openxmlformats.org/drawingml/2006/diagram" xmlns:o="urn:schemas-microsoft-com:office:office" xmlns:v="urn:schemas-microsoft-com:vml" xmlns:pvml="urn:schemas-microsoft-com:office:powerpoint" xmlns:com="http://schemas.openxmlformats.org/drawingml/2006/compatibility" xmlns:p15="http://schemas.microsoft.com/office/powerpoint/2012/main">
+    <mc:Fallback xmlns:p15="http://schemas.microsoft.com/office/powerpoint/2012/main" xmlns:com="http://schemas.openxmlformats.org/drawingml/2006/compatibility" xmlns:pvml="urn:schemas-microsoft-com:office:powerpoint" xmlns:v="urn:schemas-microsoft-com:vml" xmlns:o="urn:schemas-microsoft-com:office:office" xmlns:dgm="http://schemas.openxmlformats.org/drawingml/2006/diagram" xmlns:c="http://schemas.openxmlformats.org/drawingml/2006/chart" xmlns:mv="urn:schemas-microsoft-com:mac:vml" xmlns="">
       <p:transition spd="slow">
         <p:fade/>
       </p:transition>
@@ -24552,7 +24555,7 @@
         <p:fade/>
       </p:transition>
     </mc:Choice>
-    <mc:Fallback xmlns="" xmlns:mv="urn:schemas-microsoft-com:mac:vml" xmlns:c="http://schemas.openxmlformats.org/drawingml/2006/chart" xmlns:dgm="http://schemas.openxmlformats.org/drawingml/2006/diagram" xmlns:o="urn:schemas-microsoft-com:office:office" xmlns:v="urn:schemas-microsoft-com:vml" xmlns:pvml="urn:schemas-microsoft-com:office:powerpoint" xmlns:com="http://schemas.openxmlformats.org/drawingml/2006/compatibility" xmlns:p15="http://schemas.microsoft.com/office/powerpoint/2012/main">
+    <mc:Fallback xmlns:p15="http://schemas.microsoft.com/office/powerpoint/2012/main" xmlns:com="http://schemas.openxmlformats.org/drawingml/2006/compatibility" xmlns:pvml="urn:schemas-microsoft-com:office:powerpoint" xmlns:v="urn:schemas-microsoft-com:vml" xmlns:o="urn:schemas-microsoft-com:office:office" xmlns:dgm="http://schemas.openxmlformats.org/drawingml/2006/diagram" xmlns:c="http://schemas.openxmlformats.org/drawingml/2006/chart" xmlns:mv="urn:schemas-microsoft-com:mac:vml" xmlns="">
       <p:transition spd="slow">
         <p:fade/>
       </p:transition>
@@ -25308,36 +25311,6 @@
           </a:prstGeom>
         </p:spPr>
       </p:pic>
-      <p:pic>
-        <p:nvPicPr>
-          <p:cNvPr id="4" name="Picture 3"/>
-          <p:cNvPicPr>
-            <a:picLocks noChangeAspect="1"/>
-          </p:cNvPicPr>
-          <p:nvPr/>
-        </p:nvPicPr>
-        <p:blipFill>
-          <a:blip r:embed="rId10">
-            <a:extLst>
-              <a:ext uri="{28A0092B-C50C-407E-A947-70E740481C1C}">
-                <a14:useLocalDpi xmlns:a14="http://schemas.microsoft.com/office/drawing/2010/main" val="0"/>
-              </a:ext>
-            </a:extLst>
-          </a:blip>
-          <a:stretch>
-            <a:fillRect/>
-          </a:stretch>
-        </p:blipFill>
-        <p:spPr>
-          <a:xfrm flipH="1">
-            <a:off x="8705893" y="1041397"/>
-            <a:ext cx="1009438" cy="2074042"/>
-          </a:xfrm>
-          <a:prstGeom prst="rect">
-            <a:avLst/>
-          </a:prstGeom>
-        </p:spPr>
-      </p:pic>
       <p:sp>
         <p:nvSpPr>
           <p:cNvPr id="6" name="Oval 5"/>
@@ -25389,13 +25362,14 @@
           <p:cNvPr id="8" name="Straight Arrow Connector 7"/>
           <p:cNvCxnSpPr>
             <a:stCxn id="6" idx="6"/>
+            <a:endCxn id="10" idx="1"/>
           </p:cNvCxnSpPr>
           <p:nvPr/>
         </p:nvCxnSpPr>
         <p:spPr>
           <a:xfrm>
             <a:off x="6454140" y="1308080"/>
-            <a:ext cx="2259870" cy="0"/>
+            <a:ext cx="2171492" cy="788260"/>
           </a:xfrm>
           <a:prstGeom prst="straightConnector1">
             <a:avLst/>
@@ -25516,7 +25490,7 @@
           <p:nvPr/>
         </p:nvPicPr>
         <p:blipFill>
-          <a:blip r:embed="rId11">
+          <a:blip r:embed="rId10">
             <a:extLst>
               <a:ext uri="{28A0092B-C50C-407E-A947-70E740481C1C}">
                 <a14:useLocalDpi xmlns:a14="http://schemas.microsoft.com/office/drawing/2010/main" val="0"/>
@@ -25546,7 +25520,7 @@
           <p:nvPr/>
         </p:nvPicPr>
         <p:blipFill>
-          <a:blip r:embed="rId12">
+          <a:blip r:embed="rId11">
             <a:extLst>
               <a:ext uri="{28A0092B-C50C-407E-A947-70E740481C1C}">
                 <a14:useLocalDpi xmlns:a14="http://schemas.microsoft.com/office/drawing/2010/main" val="0"/>
@@ -25567,6 +25541,36 @@
           </a:prstGeom>
         </p:spPr>
       </p:pic>
+      <p:pic>
+        <p:nvPicPr>
+          <p:cNvPr id="10" name="Picture 9"/>
+          <p:cNvPicPr>
+            <a:picLocks noChangeAspect="1"/>
+          </p:cNvPicPr>
+          <p:nvPr/>
+        </p:nvPicPr>
+        <p:blipFill>
+          <a:blip r:embed="rId12">
+            <a:extLst>
+              <a:ext uri="{28A0092B-C50C-407E-A947-70E740481C1C}">
+                <a14:useLocalDpi xmlns:a14="http://schemas.microsoft.com/office/drawing/2010/main" val="0"/>
+              </a:ext>
+            </a:extLst>
+          </a:blip>
+          <a:stretch>
+            <a:fillRect/>
+          </a:stretch>
+        </p:blipFill>
+        <p:spPr>
+          <a:xfrm>
+            <a:off x="8625632" y="1056378"/>
+            <a:ext cx="1169957" cy="2079923"/>
+          </a:xfrm>
+          <a:prstGeom prst="rect">
+            <a:avLst/>
+          </a:prstGeom>
+        </p:spPr>
+      </p:pic>
     </p:spTree>
   </p:cSld>
   <p:clrMapOvr>
@@ -25578,7 +25582,7 @@
         <p:fade/>
       </p:transition>
     </mc:Choice>
-    <mc:Fallback xmlns="" xmlns:mv="urn:schemas-microsoft-com:mac:vml" xmlns:c="http://schemas.openxmlformats.org/drawingml/2006/chart" xmlns:dgm="http://schemas.openxmlformats.org/drawingml/2006/diagram" xmlns:o="urn:schemas-microsoft-com:office:office" xmlns:v="urn:schemas-microsoft-com:vml" xmlns:pvml="urn:schemas-microsoft-com:office:powerpoint" xmlns:com="http://schemas.openxmlformats.org/drawingml/2006/compatibility" xmlns:p15="http://schemas.microsoft.com/office/powerpoint/2012/main">
+    <mc:Fallback xmlns:p15="http://schemas.microsoft.com/office/powerpoint/2012/main" xmlns:com="http://schemas.openxmlformats.org/drawingml/2006/compatibility" xmlns:pvml="urn:schemas-microsoft-com:office:powerpoint" xmlns:v="urn:schemas-microsoft-com:vml" xmlns:o="urn:schemas-microsoft-com:office:office" xmlns:dgm="http://schemas.openxmlformats.org/drawingml/2006/diagram" xmlns:c="http://schemas.openxmlformats.org/drawingml/2006/chart" xmlns:mv="urn:schemas-microsoft-com:mac:vml" xmlns="">
       <p:transition spd="slow">
         <p:fade/>
       </p:transition>
@@ -25941,7 +25945,7 @@
         <p:fade/>
       </p:transition>
     </mc:Choice>
-    <mc:Fallback xmlns="" xmlns:mv="urn:schemas-microsoft-com:mac:vml" xmlns:c="http://schemas.openxmlformats.org/drawingml/2006/chart" xmlns:dgm="http://schemas.openxmlformats.org/drawingml/2006/diagram" xmlns:o="urn:schemas-microsoft-com:office:office" xmlns:v="urn:schemas-microsoft-com:vml" xmlns:pvml="urn:schemas-microsoft-com:office:powerpoint" xmlns:com="http://schemas.openxmlformats.org/drawingml/2006/compatibility" xmlns:p15="http://schemas.microsoft.com/office/powerpoint/2012/main">
+    <mc:Fallback xmlns:p15="http://schemas.microsoft.com/office/powerpoint/2012/main" xmlns:com="http://schemas.openxmlformats.org/drawingml/2006/compatibility" xmlns:pvml="urn:schemas-microsoft-com:office:powerpoint" xmlns:v="urn:schemas-microsoft-com:vml" xmlns:o="urn:schemas-microsoft-com:office:office" xmlns:dgm="http://schemas.openxmlformats.org/drawingml/2006/diagram" xmlns:c="http://schemas.openxmlformats.org/drawingml/2006/chart" xmlns:mv="urn:schemas-microsoft-com:mac:vml" xmlns="">
       <p:transition spd="slow">
         <p:fade/>
       </p:transition>
@@ -26610,7 +26614,7 @@
         <p:fade/>
       </p:transition>
     </mc:Choice>
-    <mc:Fallback xmlns="" xmlns:mv="urn:schemas-microsoft-com:mac:vml" xmlns:c="http://schemas.openxmlformats.org/drawingml/2006/chart" xmlns:dgm="http://schemas.openxmlformats.org/drawingml/2006/diagram" xmlns:o="urn:schemas-microsoft-com:office:office" xmlns:v="urn:schemas-microsoft-com:vml" xmlns:pvml="urn:schemas-microsoft-com:office:powerpoint" xmlns:com="http://schemas.openxmlformats.org/drawingml/2006/compatibility" xmlns:p15="http://schemas.microsoft.com/office/powerpoint/2012/main">
+    <mc:Fallback xmlns:p15="http://schemas.microsoft.com/office/powerpoint/2012/main" xmlns:com="http://schemas.openxmlformats.org/drawingml/2006/compatibility" xmlns:pvml="urn:schemas-microsoft-com:office:powerpoint" xmlns:v="urn:schemas-microsoft-com:vml" xmlns:o="urn:schemas-microsoft-com:office:office" xmlns:dgm="http://schemas.openxmlformats.org/drawingml/2006/diagram" xmlns:c="http://schemas.openxmlformats.org/drawingml/2006/chart" xmlns:mv="urn:schemas-microsoft-com:mac:vml" xmlns="">
       <p:transition spd="slow">
         <p:fade/>
       </p:transition>

</xml_diff>